<commit_message>
subindo a apresentação da sprint
</commit_message>
<xml_diff>
--- a/documentos/cyber life.pptx
+++ b/documentos/cyber life.pptx
@@ -1,45 +1,78 @@
 
 <file path=ppt/presentation.xml><?xml version="1.0" encoding="utf-8"?>
-<p:presentation xmlns:a="http://schemas.openxmlformats.org/drawingml/2006/main" xmlns:r="http://schemas.openxmlformats.org/officeDocument/2006/relationships" xmlns:p="http://schemas.openxmlformats.org/presentationml/2006/main" embedTrueTypeFonts="1" saveSubsetFonts="1">
+<p:presentation xmlns:a="http://schemas.openxmlformats.org/drawingml/2006/main" xmlns:r="http://schemas.openxmlformats.org/officeDocument/2006/relationships" xmlns:p="http://schemas.openxmlformats.org/presentationml/2006/main" saveSubsetFonts="1" embedTrueTypeFonts="true">
   <p:sldMasterIdLst>
     <p:sldMasterId id="2147483648" r:id="rId1"/>
   </p:sldMasterIdLst>
   <p:sldIdLst>
-    <p:sldId id="256" r:id="rId2"/>
-    <p:sldId id="257" r:id="rId3"/>
-    <p:sldId id="258" r:id="rId4"/>
-    <p:sldId id="259" r:id="rId5"/>
-    <p:sldId id="260" r:id="rId6"/>
-    <p:sldId id="261" r:id="rId7"/>
-    <p:sldId id="262" r:id="rId8"/>
-    <p:sldId id="263" r:id="rId9"/>
-    <p:sldId id="264" r:id="rId10"/>
-    <p:sldId id="265" r:id="rId11"/>
+    <p:sldId id="256" r:id="rId20"/>
+    <p:sldId id="257" r:id="rId21"/>
+    <p:sldId id="258" r:id="rId22"/>
+    <p:sldId id="259" r:id="rId23"/>
+    <p:sldId id="260" r:id="rId24"/>
+    <p:sldId id="261" r:id="rId25"/>
+    <p:sldId id="262" r:id="rId26"/>
+    <p:sldId id="263" r:id="rId27"/>
+    <p:sldId id="264" r:id="rId28"/>
+    <p:sldId id="265" r:id="rId29"/>
   </p:sldIdLst>
   <p:sldSz cx="18288000" cy="10287000"/>
   <p:notesSz cx="6858000" cy="9144000"/>
   <p:embeddedFontLst>
     <p:embeddedFont>
-      <p:font typeface="Arimo" panose="020B0604020202020204" charset="0"/>
+      <p:font typeface="Josefin Slab" charset="1" panose="02000000000000000000"/>
+      <p:regular r:id="rId6"/>
+    </p:embeddedFont>
+    <p:embeddedFont>
+      <p:font typeface="Josefin Slab Bold" charset="1" panose="02000000000000000000"/>
+      <p:regular r:id="rId7"/>
+    </p:embeddedFont>
+    <p:embeddedFont>
+      <p:font typeface="Josefin Slab Italics" charset="1" panose="02000000000000000000"/>
+      <p:regular r:id="rId8"/>
+    </p:embeddedFont>
+    <p:embeddedFont>
+      <p:font typeface="Josefin Slab Bold Italics" charset="1" panose="00000000000000000000"/>
+      <p:regular r:id="rId9"/>
+    </p:embeddedFont>
+    <p:embeddedFont>
+      <p:font typeface="Arimo" charset="1" panose="020B0604020202020204"/>
+      <p:regular r:id="rId10"/>
+    </p:embeddedFont>
+    <p:embeddedFont>
+      <p:font typeface="Arimo Bold" charset="1" panose="020B0704020202020204"/>
+      <p:regular r:id="rId11"/>
+    </p:embeddedFont>
+    <p:embeddedFont>
+      <p:font typeface="Arimo Italics" charset="1" panose="020B0604020202090204"/>
       <p:regular r:id="rId12"/>
     </p:embeddedFont>
     <p:embeddedFont>
-      <p:font typeface="Calibri" panose="020F0502020204030204" pitchFamily="34" charset="0"/>
+      <p:font typeface="Arimo Bold Italics" charset="1" panose="020B0704020202090204"/>
       <p:regular r:id="rId13"/>
-      <p:bold r:id="rId14"/>
-      <p:italic r:id="rId15"/>
-      <p:boldItalic r:id="rId16"/>
     </p:embeddedFont>
     <p:embeddedFont>
-      <p:font typeface="Josefin Slab" panose="020B0604020202020204" charset="0"/>
+      <p:font typeface="Sanchez" charset="1" panose="02000000000000000000"/>
+      <p:regular r:id="rId14"/>
+    </p:embeddedFont>
+    <p:embeddedFont>
+      <p:font typeface="Sanchez Italics" charset="1" panose="00000000000000000000"/>
+      <p:regular r:id="rId15"/>
+    </p:embeddedFont>
+    <p:embeddedFont>
+      <p:font typeface="Roboto" charset="1" panose="02000000000000000000"/>
+      <p:regular r:id="rId16"/>
+    </p:embeddedFont>
+    <p:embeddedFont>
+      <p:font typeface="Roboto Bold" charset="1" panose="02000000000000000000"/>
       <p:regular r:id="rId17"/>
     </p:embeddedFont>
     <p:embeddedFont>
-      <p:font typeface="Roboto" panose="020B0604020202020204" charset="0"/>
+      <p:font typeface="Roboto Italics" charset="1" panose="02000000000000000000"/>
       <p:regular r:id="rId18"/>
     </p:embeddedFont>
     <p:embeddedFont>
-      <p:font typeface="Sanchez" panose="020B0604020202020204" charset="0"/>
+      <p:font typeface="Roboto Bold Italics" charset="1" panose="02000000000000000000"/>
       <p:regular r:id="rId19"/>
     </p:embeddedFont>
   </p:embeddedFontLst>
@@ -138,22 +171,6 @@
       </a:defRPr>
     </a:lvl9pPr>
   </p:defaultTextStyle>
-  <p:extLst>
-    <p:ext uri="{EFAFB233-063F-42B5-8137-9DF3F51BA10A}">
-      <p15:sldGuideLst xmlns:p15="http://schemas.microsoft.com/office/powerpoint/2012/main">
-        <p15:guide id="1" orient="horz" pos="2160">
-          <p15:clr>
-            <a:srgbClr val="A4A3A4"/>
-          </p15:clr>
-        </p15:guide>
-        <p15:guide id="2" pos="2880">
-          <p15:clr>
-            <a:srgbClr val="A4A3A4"/>
-          </p15:clr>
-        </p15:guide>
-      </p15:sldGuideLst>
-    </p:ext>
-  </p:extLst>
 </p:presentation>
 </file>
 
@@ -195,9 +212,10 @@
           <a:lstStyle/>
           <a:p>
             <a:r>
-              <a:rPr lang="en-US"/>
+              <a:rPr lang="en-US" smtClean="0"/>
               <a:t>Click to edit Master title style</a:t>
             </a:r>
+            <a:endParaRPr lang="en-US"/>
           </a:p>
         </p:txBody>
       </p:sp>
@@ -313,9 +331,10 @@
           </a:lstStyle>
           <a:p>
             <a:r>
-              <a:rPr lang="en-US"/>
+              <a:rPr lang="en-US" smtClean="0"/>
               <a:t>Click to edit Master subtitle style</a:t>
             </a:r>
+            <a:endParaRPr lang="en-US"/>
           </a:p>
         </p:txBody>
       </p:sp>
@@ -337,7 +356,7 @@
             <a:fld id="{1D8BD707-D9CF-40AE-B4C6-C98DA3205C09}" type="datetimeFigureOut">
               <a:rPr lang="en-US" smtClean="0"/>
               <a:pPr/>
-              <a:t>9/18/2020</a:t>
+              <a:t>8/1/2011</a:t>
             </a:fld>
             <a:endParaRPr lang="en-US"/>
           </a:p>
@@ -380,7 +399,7 @@
             <a:fld id="{B6F15528-21DE-4FAA-801E-634DDDAF4B2B}" type="slidenum">
               <a:rPr lang="en-US" smtClean="0"/>
               <a:pPr/>
-              <a:t>‹nº›</a:t>
+              <a:t>‹#›</a:t>
             </a:fld>
             <a:endParaRPr lang="en-US"/>
           </a:p>
@@ -427,9 +446,10 @@
           <a:lstStyle/>
           <a:p>
             <a:r>
-              <a:rPr lang="en-US"/>
+              <a:rPr lang="en-US" smtClean="0"/>
               <a:t>Click to edit Master title style</a:t>
             </a:r>
+            <a:endParaRPr lang="en-US"/>
           </a:p>
         </p:txBody>
       </p:sp>
@@ -450,37 +470,38 @@
           <a:p>
             <a:pPr lvl="0"/>
             <a:r>
-              <a:rPr lang="en-US"/>
+              <a:rPr lang="en-US" smtClean="0"/>
               <a:t>Click to edit Master text styles</a:t>
             </a:r>
           </a:p>
           <a:p>
             <a:pPr lvl="1"/>
             <a:r>
-              <a:rPr lang="en-US"/>
+              <a:rPr lang="en-US" smtClean="0"/>
               <a:t>Second level</a:t>
             </a:r>
           </a:p>
           <a:p>
             <a:pPr lvl="2"/>
             <a:r>
-              <a:rPr lang="en-US"/>
+              <a:rPr lang="en-US" smtClean="0"/>
               <a:t>Third level</a:t>
             </a:r>
           </a:p>
           <a:p>
             <a:pPr lvl="3"/>
             <a:r>
-              <a:rPr lang="en-US"/>
+              <a:rPr lang="en-US" smtClean="0"/>
               <a:t>Fourth level</a:t>
             </a:r>
           </a:p>
           <a:p>
             <a:pPr lvl="4"/>
             <a:r>
-              <a:rPr lang="en-US"/>
+              <a:rPr lang="en-US" smtClean="0"/>
               <a:t>Fifth level</a:t>
             </a:r>
+            <a:endParaRPr lang="en-US"/>
           </a:p>
         </p:txBody>
       </p:sp>
@@ -502,7 +523,7 @@
             <a:fld id="{1D8BD707-D9CF-40AE-B4C6-C98DA3205C09}" type="datetimeFigureOut">
               <a:rPr lang="en-US" smtClean="0"/>
               <a:pPr/>
-              <a:t>9/18/2020</a:t>
+              <a:t>8/1/2011</a:t>
             </a:fld>
             <a:endParaRPr lang="en-US"/>
           </a:p>
@@ -545,7 +566,7 @@
             <a:fld id="{B6F15528-21DE-4FAA-801E-634DDDAF4B2B}" type="slidenum">
               <a:rPr lang="en-US" smtClean="0"/>
               <a:pPr/>
-              <a:t>‹nº›</a:t>
+              <a:t>‹#›</a:t>
             </a:fld>
             <a:endParaRPr lang="en-US"/>
           </a:p>
@@ -597,9 +618,10 @@
           <a:lstStyle/>
           <a:p>
             <a:r>
-              <a:rPr lang="en-US"/>
+              <a:rPr lang="en-US" smtClean="0"/>
               <a:t>Click to edit Master title style</a:t>
             </a:r>
+            <a:endParaRPr lang="en-US"/>
           </a:p>
         </p:txBody>
       </p:sp>
@@ -625,37 +647,38 @@
           <a:p>
             <a:pPr lvl="0"/>
             <a:r>
-              <a:rPr lang="en-US"/>
+              <a:rPr lang="en-US" smtClean="0"/>
               <a:t>Click to edit Master text styles</a:t>
             </a:r>
           </a:p>
           <a:p>
             <a:pPr lvl="1"/>
             <a:r>
-              <a:rPr lang="en-US"/>
+              <a:rPr lang="en-US" smtClean="0"/>
               <a:t>Second level</a:t>
             </a:r>
           </a:p>
           <a:p>
             <a:pPr lvl="2"/>
             <a:r>
-              <a:rPr lang="en-US"/>
+              <a:rPr lang="en-US" smtClean="0"/>
               <a:t>Third level</a:t>
             </a:r>
           </a:p>
           <a:p>
             <a:pPr lvl="3"/>
             <a:r>
-              <a:rPr lang="en-US"/>
+              <a:rPr lang="en-US" smtClean="0"/>
               <a:t>Fourth level</a:t>
             </a:r>
           </a:p>
           <a:p>
             <a:pPr lvl="4"/>
             <a:r>
-              <a:rPr lang="en-US"/>
+              <a:rPr lang="en-US" smtClean="0"/>
               <a:t>Fifth level</a:t>
             </a:r>
+            <a:endParaRPr lang="en-US"/>
           </a:p>
         </p:txBody>
       </p:sp>
@@ -677,7 +700,7 @@
             <a:fld id="{1D8BD707-D9CF-40AE-B4C6-C98DA3205C09}" type="datetimeFigureOut">
               <a:rPr lang="en-US" smtClean="0"/>
               <a:pPr/>
-              <a:t>9/18/2020</a:t>
+              <a:t>8/1/2011</a:t>
             </a:fld>
             <a:endParaRPr lang="en-US"/>
           </a:p>
@@ -720,7 +743,7 @@
             <a:fld id="{B6F15528-21DE-4FAA-801E-634DDDAF4B2B}" type="slidenum">
               <a:rPr lang="en-US" smtClean="0"/>
               <a:pPr/>
-              <a:t>‹nº›</a:t>
+              <a:t>‹#›</a:t>
             </a:fld>
             <a:endParaRPr lang="en-US"/>
           </a:p>
@@ -767,9 +790,10 @@
           <a:lstStyle/>
           <a:p>
             <a:r>
-              <a:rPr lang="en-US"/>
+              <a:rPr lang="en-US" smtClean="0"/>
               <a:t>Click to edit Master title style</a:t>
             </a:r>
+            <a:endParaRPr lang="en-US"/>
           </a:p>
         </p:txBody>
       </p:sp>
@@ -790,37 +814,38 @@
           <a:p>
             <a:pPr lvl="0"/>
             <a:r>
-              <a:rPr lang="en-US"/>
+              <a:rPr lang="en-US" smtClean="0"/>
               <a:t>Click to edit Master text styles</a:t>
             </a:r>
           </a:p>
           <a:p>
             <a:pPr lvl="1"/>
             <a:r>
-              <a:rPr lang="en-US"/>
+              <a:rPr lang="en-US" smtClean="0"/>
               <a:t>Second level</a:t>
             </a:r>
           </a:p>
           <a:p>
             <a:pPr lvl="2"/>
             <a:r>
-              <a:rPr lang="en-US"/>
+              <a:rPr lang="en-US" smtClean="0"/>
               <a:t>Third level</a:t>
             </a:r>
           </a:p>
           <a:p>
             <a:pPr lvl="3"/>
             <a:r>
-              <a:rPr lang="en-US"/>
+              <a:rPr lang="en-US" smtClean="0"/>
               <a:t>Fourth level</a:t>
             </a:r>
           </a:p>
           <a:p>
             <a:pPr lvl="4"/>
             <a:r>
-              <a:rPr lang="en-US"/>
+              <a:rPr lang="en-US" smtClean="0"/>
               <a:t>Fifth level</a:t>
             </a:r>
+            <a:endParaRPr lang="en-US"/>
           </a:p>
         </p:txBody>
       </p:sp>
@@ -842,7 +867,7 @@
             <a:fld id="{1D8BD707-D9CF-40AE-B4C6-C98DA3205C09}" type="datetimeFigureOut">
               <a:rPr lang="en-US" smtClean="0"/>
               <a:pPr/>
-              <a:t>9/18/2020</a:t>
+              <a:t>8/1/2011</a:t>
             </a:fld>
             <a:endParaRPr lang="en-US"/>
           </a:p>
@@ -885,7 +910,7 @@
             <a:fld id="{B6F15528-21DE-4FAA-801E-634DDDAF4B2B}" type="slidenum">
               <a:rPr lang="en-US" smtClean="0"/>
               <a:pPr/>
-              <a:t>‹nº›</a:t>
+              <a:t>‹#›</a:t>
             </a:fld>
             <a:endParaRPr lang="en-US"/>
           </a:p>
@@ -941,9 +966,10 @@
           </a:lstStyle>
           <a:p>
             <a:r>
-              <a:rPr lang="en-US"/>
+              <a:rPr lang="en-US" smtClean="0"/>
               <a:t>Click to edit Master title style</a:t>
             </a:r>
+            <a:endParaRPr lang="en-US"/>
           </a:p>
         </p:txBody>
       </p:sp>
@@ -1060,7 +1086,7 @@
           <a:p>
             <a:pPr lvl="0"/>
             <a:r>
-              <a:rPr lang="en-US"/>
+              <a:rPr lang="en-US" smtClean="0"/>
               <a:t>Click to edit Master text styles</a:t>
             </a:r>
           </a:p>
@@ -1084,7 +1110,7 @@
             <a:fld id="{1D8BD707-D9CF-40AE-B4C6-C98DA3205C09}" type="datetimeFigureOut">
               <a:rPr lang="en-US" smtClean="0"/>
               <a:pPr/>
-              <a:t>9/18/2020</a:t>
+              <a:t>8/1/2011</a:t>
             </a:fld>
             <a:endParaRPr lang="en-US"/>
           </a:p>
@@ -1127,7 +1153,7 @@
             <a:fld id="{B6F15528-21DE-4FAA-801E-634DDDAF4B2B}" type="slidenum">
               <a:rPr lang="en-US" smtClean="0"/>
               <a:pPr/>
-              <a:t>‹nº›</a:t>
+              <a:t>‹#›</a:t>
             </a:fld>
             <a:endParaRPr lang="en-US"/>
           </a:p>
@@ -1174,9 +1200,10 @@
           <a:lstStyle/>
           <a:p>
             <a:r>
-              <a:rPr lang="en-US"/>
+              <a:rPr lang="en-US" smtClean="0"/>
               <a:t>Click to edit Master title style</a:t>
             </a:r>
+            <a:endParaRPr lang="en-US"/>
           </a:p>
         </p:txBody>
       </p:sp>
@@ -1230,37 +1257,38 @@
           <a:p>
             <a:pPr lvl="0"/>
             <a:r>
-              <a:rPr lang="en-US"/>
+              <a:rPr lang="en-US" smtClean="0"/>
               <a:t>Click to edit Master text styles</a:t>
             </a:r>
           </a:p>
           <a:p>
             <a:pPr lvl="1"/>
             <a:r>
-              <a:rPr lang="en-US"/>
+              <a:rPr lang="en-US" smtClean="0"/>
               <a:t>Second level</a:t>
             </a:r>
           </a:p>
           <a:p>
             <a:pPr lvl="2"/>
             <a:r>
-              <a:rPr lang="en-US"/>
+              <a:rPr lang="en-US" smtClean="0"/>
               <a:t>Third level</a:t>
             </a:r>
           </a:p>
           <a:p>
             <a:pPr lvl="3"/>
             <a:r>
-              <a:rPr lang="en-US"/>
+              <a:rPr lang="en-US" smtClean="0"/>
               <a:t>Fourth level</a:t>
             </a:r>
           </a:p>
           <a:p>
             <a:pPr lvl="4"/>
             <a:r>
-              <a:rPr lang="en-US"/>
+              <a:rPr lang="en-US" smtClean="0"/>
               <a:t>Fifth level</a:t>
             </a:r>
+            <a:endParaRPr lang="en-US"/>
           </a:p>
         </p:txBody>
       </p:sp>
@@ -1314,37 +1342,38 @@
           <a:p>
             <a:pPr lvl="0"/>
             <a:r>
-              <a:rPr lang="en-US"/>
+              <a:rPr lang="en-US" smtClean="0"/>
               <a:t>Click to edit Master text styles</a:t>
             </a:r>
           </a:p>
           <a:p>
             <a:pPr lvl="1"/>
             <a:r>
-              <a:rPr lang="en-US"/>
+              <a:rPr lang="en-US" smtClean="0"/>
               <a:t>Second level</a:t>
             </a:r>
           </a:p>
           <a:p>
             <a:pPr lvl="2"/>
             <a:r>
-              <a:rPr lang="en-US"/>
+              <a:rPr lang="en-US" smtClean="0"/>
               <a:t>Third level</a:t>
             </a:r>
           </a:p>
           <a:p>
             <a:pPr lvl="3"/>
             <a:r>
-              <a:rPr lang="en-US"/>
+              <a:rPr lang="en-US" smtClean="0"/>
               <a:t>Fourth level</a:t>
             </a:r>
           </a:p>
           <a:p>
             <a:pPr lvl="4"/>
             <a:r>
-              <a:rPr lang="en-US"/>
+              <a:rPr lang="en-US" smtClean="0"/>
               <a:t>Fifth level</a:t>
             </a:r>
+            <a:endParaRPr lang="en-US"/>
           </a:p>
         </p:txBody>
       </p:sp>
@@ -1366,7 +1395,7 @@
             <a:fld id="{1D8BD707-D9CF-40AE-B4C6-C98DA3205C09}" type="datetimeFigureOut">
               <a:rPr lang="en-US" smtClean="0"/>
               <a:pPr/>
-              <a:t>9/18/2020</a:t>
+              <a:t>8/1/2011</a:t>
             </a:fld>
             <a:endParaRPr lang="en-US"/>
           </a:p>
@@ -1409,7 +1438,7 @@
             <a:fld id="{B6F15528-21DE-4FAA-801E-634DDDAF4B2B}" type="slidenum">
               <a:rPr lang="en-US" smtClean="0"/>
               <a:pPr/>
-              <a:t>‹nº›</a:t>
+              <a:t>‹#›</a:t>
             </a:fld>
             <a:endParaRPr lang="en-US"/>
           </a:p>
@@ -1460,9 +1489,10 @@
           </a:lstStyle>
           <a:p>
             <a:r>
-              <a:rPr lang="en-US"/>
+              <a:rPr lang="en-US" smtClean="0"/>
               <a:t>Click to edit Master title style</a:t>
             </a:r>
+            <a:endParaRPr lang="en-US"/>
           </a:p>
         </p:txBody>
       </p:sp>
@@ -1525,7 +1555,7 @@
           <a:p>
             <a:pPr lvl="0"/>
             <a:r>
-              <a:rPr lang="en-US"/>
+              <a:rPr lang="en-US" smtClean="0"/>
               <a:t>Click to edit Master text styles</a:t>
             </a:r>
           </a:p>
@@ -1581,37 +1611,38 @@
           <a:p>
             <a:pPr lvl="0"/>
             <a:r>
-              <a:rPr lang="en-US"/>
+              <a:rPr lang="en-US" smtClean="0"/>
               <a:t>Click to edit Master text styles</a:t>
             </a:r>
           </a:p>
           <a:p>
             <a:pPr lvl="1"/>
             <a:r>
-              <a:rPr lang="en-US"/>
+              <a:rPr lang="en-US" smtClean="0"/>
               <a:t>Second level</a:t>
             </a:r>
           </a:p>
           <a:p>
             <a:pPr lvl="2"/>
             <a:r>
-              <a:rPr lang="en-US"/>
+              <a:rPr lang="en-US" smtClean="0"/>
               <a:t>Third level</a:t>
             </a:r>
           </a:p>
           <a:p>
             <a:pPr lvl="3"/>
             <a:r>
-              <a:rPr lang="en-US"/>
+              <a:rPr lang="en-US" smtClean="0"/>
               <a:t>Fourth level</a:t>
             </a:r>
           </a:p>
           <a:p>
             <a:pPr lvl="4"/>
             <a:r>
-              <a:rPr lang="en-US"/>
+              <a:rPr lang="en-US" smtClean="0"/>
               <a:t>Fifth level</a:t>
             </a:r>
+            <a:endParaRPr lang="en-US"/>
           </a:p>
         </p:txBody>
       </p:sp>
@@ -1674,7 +1705,7 @@
           <a:p>
             <a:pPr lvl="0"/>
             <a:r>
-              <a:rPr lang="en-US"/>
+              <a:rPr lang="en-US" smtClean="0"/>
               <a:t>Click to edit Master text styles</a:t>
             </a:r>
           </a:p>
@@ -1730,37 +1761,38 @@
           <a:p>
             <a:pPr lvl="0"/>
             <a:r>
-              <a:rPr lang="en-US"/>
+              <a:rPr lang="en-US" smtClean="0"/>
               <a:t>Click to edit Master text styles</a:t>
             </a:r>
           </a:p>
           <a:p>
             <a:pPr lvl="1"/>
             <a:r>
-              <a:rPr lang="en-US"/>
+              <a:rPr lang="en-US" smtClean="0"/>
               <a:t>Second level</a:t>
             </a:r>
           </a:p>
           <a:p>
             <a:pPr lvl="2"/>
             <a:r>
-              <a:rPr lang="en-US"/>
+              <a:rPr lang="en-US" smtClean="0"/>
               <a:t>Third level</a:t>
             </a:r>
           </a:p>
           <a:p>
             <a:pPr lvl="3"/>
             <a:r>
-              <a:rPr lang="en-US"/>
+              <a:rPr lang="en-US" smtClean="0"/>
               <a:t>Fourth level</a:t>
             </a:r>
           </a:p>
           <a:p>
             <a:pPr lvl="4"/>
             <a:r>
-              <a:rPr lang="en-US"/>
+              <a:rPr lang="en-US" smtClean="0"/>
               <a:t>Fifth level</a:t>
             </a:r>
+            <a:endParaRPr lang="en-US"/>
           </a:p>
         </p:txBody>
       </p:sp>
@@ -1782,7 +1814,7 @@
             <a:fld id="{1D8BD707-D9CF-40AE-B4C6-C98DA3205C09}" type="datetimeFigureOut">
               <a:rPr lang="en-US" smtClean="0"/>
               <a:pPr/>
-              <a:t>9/18/2020</a:t>
+              <a:t>8/1/2011</a:t>
             </a:fld>
             <a:endParaRPr lang="en-US"/>
           </a:p>
@@ -1825,7 +1857,7 @@
             <a:fld id="{B6F15528-21DE-4FAA-801E-634DDDAF4B2B}" type="slidenum">
               <a:rPr lang="en-US" smtClean="0"/>
               <a:pPr/>
-              <a:t>‹nº›</a:t>
+              <a:t>‹#›</a:t>
             </a:fld>
             <a:endParaRPr lang="en-US"/>
           </a:p>
@@ -1872,9 +1904,10 @@
           <a:lstStyle/>
           <a:p>
             <a:r>
-              <a:rPr lang="en-US"/>
+              <a:rPr lang="en-US" smtClean="0"/>
               <a:t>Click to edit Master title style</a:t>
             </a:r>
+            <a:endParaRPr lang="en-US"/>
           </a:p>
         </p:txBody>
       </p:sp>
@@ -1896,7 +1929,7 @@
             <a:fld id="{1D8BD707-D9CF-40AE-B4C6-C98DA3205C09}" type="datetimeFigureOut">
               <a:rPr lang="en-US" smtClean="0"/>
               <a:pPr/>
-              <a:t>9/18/2020</a:t>
+              <a:t>8/1/2011</a:t>
             </a:fld>
             <a:endParaRPr lang="en-US"/>
           </a:p>
@@ -1939,7 +1972,7 @@
             <a:fld id="{B6F15528-21DE-4FAA-801E-634DDDAF4B2B}" type="slidenum">
               <a:rPr lang="en-US" smtClean="0"/>
               <a:pPr/>
-              <a:t>‹nº›</a:t>
+              <a:t>‹#›</a:t>
             </a:fld>
             <a:endParaRPr lang="en-US"/>
           </a:p>
@@ -1988,7 +2021,7 @@
             <a:fld id="{1D8BD707-D9CF-40AE-B4C6-C98DA3205C09}" type="datetimeFigureOut">
               <a:rPr lang="en-US" smtClean="0"/>
               <a:pPr/>
-              <a:t>9/18/2020</a:t>
+              <a:t>8/1/2011</a:t>
             </a:fld>
             <a:endParaRPr lang="en-US"/>
           </a:p>
@@ -2031,7 +2064,7 @@
             <a:fld id="{B6F15528-21DE-4FAA-801E-634DDDAF4B2B}" type="slidenum">
               <a:rPr lang="en-US" smtClean="0"/>
               <a:pPr/>
-              <a:t>‹nº›</a:t>
+              <a:t>‹#›</a:t>
             </a:fld>
             <a:endParaRPr lang="en-US"/>
           </a:p>
@@ -2087,9 +2120,10 @@
           </a:lstStyle>
           <a:p>
             <a:r>
-              <a:rPr lang="en-US"/>
+              <a:rPr lang="en-US" smtClean="0"/>
               <a:t>Click to edit Master title style</a:t>
             </a:r>
+            <a:endParaRPr lang="en-US"/>
           </a:p>
         </p:txBody>
       </p:sp>
@@ -2143,37 +2177,38 @@
           <a:p>
             <a:pPr lvl="0"/>
             <a:r>
-              <a:rPr lang="en-US"/>
+              <a:rPr lang="en-US" smtClean="0"/>
               <a:t>Click to edit Master text styles</a:t>
             </a:r>
           </a:p>
           <a:p>
             <a:pPr lvl="1"/>
             <a:r>
-              <a:rPr lang="en-US"/>
+              <a:rPr lang="en-US" smtClean="0"/>
               <a:t>Second level</a:t>
             </a:r>
           </a:p>
           <a:p>
             <a:pPr lvl="2"/>
             <a:r>
-              <a:rPr lang="en-US"/>
+              <a:rPr lang="en-US" smtClean="0"/>
               <a:t>Third level</a:t>
             </a:r>
           </a:p>
           <a:p>
             <a:pPr lvl="3"/>
             <a:r>
-              <a:rPr lang="en-US"/>
+              <a:rPr lang="en-US" smtClean="0"/>
               <a:t>Fourth level</a:t>
             </a:r>
           </a:p>
           <a:p>
             <a:pPr lvl="4"/>
             <a:r>
-              <a:rPr lang="en-US"/>
+              <a:rPr lang="en-US" smtClean="0"/>
               <a:t>Fifth level</a:t>
             </a:r>
+            <a:endParaRPr lang="en-US"/>
           </a:p>
         </p:txBody>
       </p:sp>
@@ -2236,7 +2271,7 @@
           <a:p>
             <a:pPr lvl="0"/>
             <a:r>
-              <a:rPr lang="en-US"/>
+              <a:rPr lang="en-US" smtClean="0"/>
               <a:t>Click to edit Master text styles</a:t>
             </a:r>
           </a:p>
@@ -2260,7 +2295,7 @@
             <a:fld id="{1D8BD707-D9CF-40AE-B4C6-C98DA3205C09}" type="datetimeFigureOut">
               <a:rPr lang="en-US" smtClean="0"/>
               <a:pPr/>
-              <a:t>9/18/2020</a:t>
+              <a:t>8/1/2011</a:t>
             </a:fld>
             <a:endParaRPr lang="en-US"/>
           </a:p>
@@ -2303,7 +2338,7 @@
             <a:fld id="{B6F15528-21DE-4FAA-801E-634DDDAF4B2B}" type="slidenum">
               <a:rPr lang="en-US" smtClean="0"/>
               <a:pPr/>
-              <a:t>‹nº›</a:t>
+              <a:t>‹#›</a:t>
             </a:fld>
             <a:endParaRPr lang="en-US"/>
           </a:p>
@@ -2359,9 +2394,10 @@
           </a:lstStyle>
           <a:p>
             <a:r>
-              <a:rPr lang="en-US"/>
+              <a:rPr lang="en-US" smtClean="0"/>
               <a:t>Click to edit Master title style</a:t>
             </a:r>
+            <a:endParaRPr lang="en-US"/>
           </a:p>
         </p:txBody>
       </p:sp>
@@ -2485,7 +2521,7 @@
           <a:p>
             <a:pPr lvl="0"/>
             <a:r>
-              <a:rPr lang="en-US"/>
+              <a:rPr lang="en-US" smtClean="0"/>
               <a:t>Click to edit Master text styles</a:t>
             </a:r>
           </a:p>
@@ -2509,7 +2545,7 @@
             <a:fld id="{1D8BD707-D9CF-40AE-B4C6-C98DA3205C09}" type="datetimeFigureOut">
               <a:rPr lang="en-US" smtClean="0"/>
               <a:pPr/>
-              <a:t>9/18/2020</a:t>
+              <a:t>8/1/2011</a:t>
             </a:fld>
             <a:endParaRPr lang="en-US"/>
           </a:p>
@@ -2552,7 +2588,7 @@
             <a:fld id="{B6F15528-21DE-4FAA-801E-634DDDAF4B2B}" type="slidenum">
               <a:rPr lang="en-US" smtClean="0"/>
               <a:pPr/>
-              <a:t>‹nº›</a:t>
+              <a:t>‹#›</a:t>
             </a:fld>
             <a:endParaRPr lang="en-US"/>
           </a:p>
@@ -2614,9 +2650,10 @@
           <a:lstStyle/>
           <a:p>
             <a:r>
-              <a:rPr lang="en-US"/>
+              <a:rPr lang="en-US" smtClean="0"/>
               <a:t>Click to edit Master title style</a:t>
             </a:r>
+            <a:endParaRPr lang="en-US"/>
           </a:p>
         </p:txBody>
       </p:sp>
@@ -2647,37 +2684,38 @@
           <a:p>
             <a:pPr lvl="0"/>
             <a:r>
-              <a:rPr lang="en-US"/>
+              <a:rPr lang="en-US" smtClean="0"/>
               <a:t>Click to edit Master text styles</a:t>
             </a:r>
           </a:p>
           <a:p>
             <a:pPr lvl="1"/>
             <a:r>
-              <a:rPr lang="en-US"/>
+              <a:rPr lang="en-US" smtClean="0"/>
               <a:t>Second level</a:t>
             </a:r>
           </a:p>
           <a:p>
             <a:pPr lvl="2"/>
             <a:r>
-              <a:rPr lang="en-US"/>
+              <a:rPr lang="en-US" smtClean="0"/>
               <a:t>Third level</a:t>
             </a:r>
           </a:p>
           <a:p>
             <a:pPr lvl="3"/>
             <a:r>
-              <a:rPr lang="en-US"/>
+              <a:rPr lang="en-US" smtClean="0"/>
               <a:t>Fourth level</a:t>
             </a:r>
           </a:p>
           <a:p>
             <a:pPr lvl="4"/>
             <a:r>
-              <a:rPr lang="en-US"/>
+              <a:rPr lang="en-US" smtClean="0"/>
               <a:t>Fifth level</a:t>
             </a:r>
+            <a:endParaRPr lang="en-US"/>
           </a:p>
         </p:txBody>
       </p:sp>
@@ -2717,7 +2755,7 @@
             <a:fld id="{1D8BD707-D9CF-40AE-B4C6-C98DA3205C09}" type="datetimeFigureOut">
               <a:rPr lang="en-US" smtClean="0"/>
               <a:pPr/>
-              <a:t>9/18/2020</a:t>
+              <a:t>8/1/2011</a:t>
             </a:fld>
             <a:endParaRPr lang="en-US"/>
           </a:p>
@@ -2796,7 +2834,7 @@
             <a:fld id="{B6F15528-21DE-4FAA-801E-634DDDAF4B2B}" type="slidenum">
               <a:rPr lang="en-US" smtClean="0"/>
               <a:pPr/>
-              <a:t>‹nº›</a:t>
+              <a:t>‹#›</a:t>
             </a:fld>
             <a:endParaRPr lang="en-US"/>
           </a:p>
@@ -3072,14 +3110,13 @@
 </file>
 
 <file path=ppt/slides/slide1.xml><?xml version="1.0" encoding="utf-8"?>
-<p:sld xmlns:a="http://schemas.openxmlformats.org/drawingml/2006/main" xmlns:r="http://schemas.openxmlformats.org/officeDocument/2006/relationships" xmlns:p="http://schemas.openxmlformats.org/presentationml/2006/main">
+<p:sld xmlns:p="http://schemas.openxmlformats.org/presentationml/2006/main" xmlns:a="http://schemas.openxmlformats.org/drawingml/2006/main" xmlns:r="http://schemas.openxmlformats.org/officeDocument/2006/relationships">
   <p:cSld>
     <p:bg>
       <p:bgPr>
         <a:solidFill>
           <a:srgbClr val="113C61"/>
         </a:solidFill>
-        <a:effectLst/>
       </p:bgPr>
     </p:bg>
     <p:spTree>
@@ -3098,12 +3135,12 @@
       </p:grpSpPr>
       <p:grpSp>
         <p:nvGrpSpPr>
-          <p:cNvPr id="2" name="Group 2"/>
+          <p:cNvPr name="Group 2" id="2"/>
           <p:cNvGrpSpPr/>
           <p:nvPr/>
         </p:nvGrpSpPr>
         <p:grpSpPr>
-          <a:xfrm>
+          <a:xfrm rot="0">
             <a:off x="2351129" y="3971763"/>
             <a:ext cx="10700458" cy="2343474"/>
             <a:chOff x="0" y="0"/>
@@ -3112,12 +3149,12 @@
         </p:grpSpPr>
         <p:sp>
           <p:nvSpPr>
-            <p:cNvPr id="3" name="TextBox 3"/>
-            <p:cNvSpPr txBox="1"/>
+            <p:cNvPr name="TextBox 3" id="3"/>
+            <p:cNvSpPr txBox="true"/>
             <p:nvPr/>
           </p:nvSpPr>
           <p:spPr>
-            <a:xfrm>
+            <a:xfrm rot="0">
               <a:off x="0" y="209550"/>
               <a:ext cx="14267277" cy="1809750"/>
             </a:xfrm>
@@ -3126,7 +3163,7 @@
             </a:prstGeom>
           </p:spPr>
           <p:txBody>
-            <a:bodyPr lIns="0" tIns="0" rIns="0" bIns="0" rtlCol="0" anchor="t">
+            <a:bodyPr anchor="t" rtlCol="false" tIns="0" lIns="0" bIns="0" rIns="0">
               <a:spAutoFit/>
             </a:bodyPr>
             <a:lstStyle/>
@@ -3150,12 +3187,12 @@
         </p:sp>
         <p:sp>
           <p:nvSpPr>
-            <p:cNvPr id="4" name="TextBox 4"/>
-            <p:cNvSpPr txBox="1"/>
+            <p:cNvPr name="TextBox 4" id="4"/>
+            <p:cNvSpPr txBox="true"/>
             <p:nvPr/>
           </p:nvSpPr>
           <p:spPr>
-            <a:xfrm>
+            <a:xfrm rot="0">
               <a:off x="0" y="2482859"/>
               <a:ext cx="14267277" cy="641773"/>
             </a:xfrm>
@@ -3164,7 +3201,7 @@
             </a:prstGeom>
           </p:spPr>
           <p:txBody>
-            <a:bodyPr lIns="0" tIns="0" rIns="0" bIns="0" rtlCol="0" anchor="t">
+            <a:bodyPr anchor="t" rtlCol="false" tIns="0" lIns="0" bIns="0" rIns="0">
               <a:spAutoFit/>
             </a:bodyPr>
             <a:lstStyle/>
@@ -3189,12 +3226,12 @@
       </p:grpSp>
       <p:sp>
         <p:nvSpPr>
-          <p:cNvPr id="5" name="AutoShape 5"/>
+          <p:cNvPr name="AutoShape 5" id="5"/>
           <p:cNvSpPr/>
           <p:nvPr/>
         </p:nvSpPr>
         <p:spPr>
-          <a:xfrm>
+          <a:xfrm rot="0">
             <a:off x="1028700" y="2809875"/>
             <a:ext cx="133350" cy="4667250"/>
           </a:xfrm>
@@ -3208,21 +3245,21 @@
       </p:sp>
       <p:pic>
         <p:nvPicPr>
-          <p:cNvPr id="6" name="Picture 6"/>
+          <p:cNvPr name="Picture 6" id="6"/>
           <p:cNvPicPr>
-            <a:picLocks noChangeAspect="1"/>
+            <a:picLocks noChangeAspect="true"/>
           </p:cNvPicPr>
           <p:nvPr/>
         </p:nvPicPr>
         <p:blipFill>
           <a:blip r:embed="rId2"/>
-          <a:srcRect/>
+          <a:srcRect l="0" t="0" r="0" b="0"/>
           <a:stretch>
             <a:fillRect/>
           </a:stretch>
         </p:blipFill>
         <p:spPr>
-          <a:xfrm>
+          <a:xfrm flipH="false" flipV="false" rot="0">
             <a:off x="12169565" y="1683525"/>
             <a:ext cx="5793600" cy="5793600"/>
           </a:xfrm>
@@ -3240,7 +3277,7 @@
 </file>
 
 <file path=ppt/slides/slide10.xml><?xml version="1.0" encoding="utf-8"?>
-<p:sld xmlns:a="http://schemas.openxmlformats.org/drawingml/2006/main" xmlns:r="http://schemas.openxmlformats.org/officeDocument/2006/relationships" xmlns:p="http://schemas.openxmlformats.org/presentationml/2006/main">
+<p:sld xmlns:p="http://schemas.openxmlformats.org/presentationml/2006/main" xmlns:a="http://schemas.openxmlformats.org/drawingml/2006/main" xmlns:r="http://schemas.openxmlformats.org/officeDocument/2006/relationships">
   <p:cSld>
     <p:spTree>
       <p:nvGrpSpPr>
@@ -3258,26 +3295,26 @@
       </p:grpSpPr>
       <p:grpSp>
         <p:nvGrpSpPr>
-          <p:cNvPr id="2" name="Group 2"/>
+          <p:cNvPr name="Group 2" id="2"/>
           <p:cNvGrpSpPr/>
           <p:nvPr/>
         </p:nvGrpSpPr>
         <p:grpSpPr>
-          <a:xfrm>
-            <a:off x="7996393" y="5377180"/>
-            <a:ext cx="8688008" cy="2883743"/>
+          <a:xfrm rot="0">
+            <a:off x="8611386" y="5643016"/>
+            <a:ext cx="7678051" cy="2765352"/>
             <a:chOff x="0" y="0"/>
-            <a:chExt cx="11584011" cy="3844991"/>
+            <a:chExt cx="10237401" cy="3687136"/>
           </a:xfrm>
         </p:grpSpPr>
         <p:sp>
           <p:nvSpPr>
-            <p:cNvPr id="3" name="TextBox 3"/>
-            <p:cNvSpPr txBox="1"/>
+            <p:cNvPr name="TextBox 3" id="3"/>
+            <p:cNvSpPr txBox="true"/>
             <p:nvPr/>
           </p:nvSpPr>
           <p:spPr>
-            <a:xfrm>
+            <a:xfrm rot="0">
               <a:off x="0" y="-9525"/>
               <a:ext cx="9692214" cy="1056256"/>
             </a:xfrm>
@@ -3286,7 +3323,7 @@
             </a:prstGeom>
           </p:spPr>
           <p:txBody>
-            <a:bodyPr lIns="0" tIns="0" rIns="0" bIns="0" rtlCol="0" anchor="t">
+            <a:bodyPr anchor="t" rtlCol="false" tIns="0" lIns="0" bIns="0" rIns="0">
               <a:spAutoFit/>
             </a:bodyPr>
             <a:lstStyle/>
@@ -3310,21 +3347,21 @@
         </p:sp>
         <p:sp>
           <p:nvSpPr>
-            <p:cNvPr id="4" name="TextBox 4"/>
-            <p:cNvSpPr txBox="1"/>
+            <p:cNvPr name="TextBox 4" id="4"/>
+            <p:cNvSpPr txBox="true"/>
             <p:nvPr/>
           </p:nvSpPr>
           <p:spPr>
-            <a:xfrm>
+            <a:xfrm rot="0">
               <a:off x="0" y="1905961"/>
-              <a:ext cx="10237401" cy="752475"/>
+              <a:ext cx="10237401" cy="1781175"/>
             </a:xfrm>
             <a:prstGeom prst="rect">
               <a:avLst/>
             </a:prstGeom>
           </p:spPr>
           <p:txBody>
-            <a:bodyPr lIns="0" tIns="0" rIns="0" bIns="0" rtlCol="0" anchor="t">
+            <a:bodyPr anchor="t" rtlCol="false" tIns="0" lIns="0" bIns="0" rIns="0">
               <a:spAutoFit/>
             </a:bodyPr>
             <a:lstStyle/>
@@ -3341,45 +3378,39 @@
                   </a:solidFill>
                   <a:latin typeface="Roboto"/>
                 </a:rPr>
-                <a:t>ENDEREÇO PARA CORRESPONDÊNCIA</a:t>
+                <a:t>TELEFONE:</a:t>
               </a:r>
             </a:p>
-          </p:txBody>
-        </p:sp>
-        <p:sp>
-          <p:nvSpPr>
-            <p:cNvPr id="5" name="TextBox 5"/>
-            <p:cNvSpPr txBox="1"/>
-            <p:nvPr/>
-          </p:nvSpPr>
-          <p:spPr>
-            <a:xfrm>
-              <a:off x="0" y="3161519"/>
-              <a:ext cx="11584011" cy="683472"/>
-            </a:xfrm>
-            <a:prstGeom prst="rect">
-              <a:avLst/>
-            </a:prstGeom>
-          </p:spPr>
-          <p:txBody>
-            <a:bodyPr lIns="0" tIns="0" rIns="0" bIns="0" rtlCol="0" anchor="t">
-              <a:spAutoFit/>
-            </a:bodyPr>
-            <a:lstStyle/>
             <a:p>
-              <a:pPr marL="0" lvl="0" indent="0" algn="l">
+              <a:pPr algn="l">
+                <a:lnSpc>
+                  <a:spcPts val="1679"/>
+                </a:lnSpc>
+              </a:pPr>
+            </a:p>
+            <a:p>
+              <a:pPr algn="l">
                 <a:lnSpc>
                   <a:spcPts val="4480"/>
                 </a:lnSpc>
               </a:pPr>
               <a:r>
-                <a:rPr lang="en-US" sz="2800" spc="140">
+                <a:rPr lang="en-US" sz="1200">
                   <a:solidFill>
-                    <a:srgbClr val="113C61"/>
+                    <a:srgbClr val="000000"/>
                   </a:solidFill>
-                  <a:latin typeface="Roboto"/>
+                  <a:latin typeface="Arimo"/>
                 </a:rPr>
-                <a:t>Rua Qualquer, 123, Qualquer Cidade, Estado, País</a:t>
+                <a:t>(11) </a:t>
+              </a:r>
+              <a:r>
+                <a:rPr lang="en-US" sz="3200">
+                  <a:solidFill>
+                    <a:srgbClr val="000000"/>
+                  </a:solidFill>
+                  <a:latin typeface="Arimo"/>
+                </a:rPr>
+                <a:t>96280-0727</a:t>
               </a:r>
             </a:p>
           </p:txBody>
@@ -3387,22 +3418,22 @@
       </p:grpSp>
       <p:pic>
         <p:nvPicPr>
-          <p:cNvPr id="6" name="Picture 6"/>
+          <p:cNvPr name="Picture 5" id="5"/>
           <p:cNvPicPr>
-            <a:picLocks noChangeAspect="1"/>
+            <a:picLocks noChangeAspect="true"/>
           </p:cNvPicPr>
           <p:nvPr/>
         </p:nvPicPr>
         <p:blipFill>
           <a:blip r:embed="rId2"/>
-          <a:srcRect/>
+          <a:srcRect l="0" t="0" r="0" b="0"/>
           <a:stretch>
             <a:fillRect/>
           </a:stretch>
         </p:blipFill>
         <p:spPr>
-          <a:xfrm>
-            <a:off x="456492" y="1969004"/>
+          <a:xfrm flipH="false" flipV="false" rot="0">
+            <a:off x="1028700" y="3464700"/>
             <a:ext cx="5793600" cy="5793600"/>
           </a:xfrm>
           <a:prstGeom prst="rect">
@@ -3412,13 +3443,13 @@
       </p:pic>
       <p:sp>
         <p:nvSpPr>
-          <p:cNvPr id="7" name="TextBox 7"/>
-          <p:cNvSpPr txBox="1"/>
+          <p:cNvPr name="TextBox 6" id="6"/>
+          <p:cNvSpPr txBox="true"/>
           <p:nvPr/>
         </p:nvSpPr>
         <p:spPr>
-          <a:xfrm>
-            <a:off x="8780749" y="1238250"/>
+          <a:xfrm rot="0">
+            <a:off x="1028700" y="1238250"/>
             <a:ext cx="7468594" cy="1304925"/>
           </a:xfrm>
           <a:prstGeom prst="rect">
@@ -3426,7 +3457,7 @@
           </a:prstGeom>
         </p:spPr>
         <p:txBody>
-          <a:bodyPr lIns="0" tIns="0" rIns="0" bIns="0" rtlCol="0" anchor="t">
+          <a:bodyPr anchor="t" rtlCol="false" tIns="0" lIns="0" bIns="0" rIns="0">
             <a:spAutoFit/>
           </a:bodyPr>
           <a:lstStyle/>
@@ -3444,6 +3475,44 @@
                 <a:latin typeface="Josefin Slab"/>
               </a:rPr>
               <a:t>CYBER LIFE</a:t>
+            </a:r>
+          </a:p>
+        </p:txBody>
+      </p:sp>
+      <p:sp>
+        <p:nvSpPr>
+          <p:cNvPr name="TextBox 7" id="7"/>
+          <p:cNvSpPr txBox="true"/>
+          <p:nvPr/>
+        </p:nvSpPr>
+        <p:spPr>
+          <a:xfrm rot="0">
+            <a:off x="7455069" y="3445650"/>
+            <a:ext cx="9804231" cy="1162050"/>
+          </a:xfrm>
+          <a:prstGeom prst="rect">
+            <a:avLst/>
+          </a:prstGeom>
+        </p:spPr>
+        <p:txBody>
+          <a:bodyPr anchor="t" rtlCol="false" tIns="0" lIns="0" bIns="0" rIns="0">
+            <a:spAutoFit/>
+          </a:bodyPr>
+          <a:lstStyle/>
+          <a:p>
+            <a:pPr algn="l">
+              <a:lnSpc>
+                <a:spcPts val="9000"/>
+              </a:lnSpc>
+            </a:pPr>
+            <a:r>
+              <a:rPr lang="en-US" sz="7500" spc="150">
+                <a:solidFill>
+                  <a:srgbClr val="000000"/>
+                </a:solidFill>
+                <a:latin typeface="Josefin Slab"/>
+              </a:rPr>
+              <a:t>Obrigado pela atenção</a:t>
             </a:r>
           </a:p>
         </p:txBody>
@@ -3457,14 +3526,13 @@
 </file>
 
 <file path=ppt/slides/slide2.xml><?xml version="1.0" encoding="utf-8"?>
-<p:sld xmlns:a="http://schemas.openxmlformats.org/drawingml/2006/main" xmlns:r="http://schemas.openxmlformats.org/officeDocument/2006/relationships" xmlns:p="http://schemas.openxmlformats.org/presentationml/2006/main">
+<p:sld xmlns:p="http://schemas.openxmlformats.org/presentationml/2006/main" xmlns:a="http://schemas.openxmlformats.org/drawingml/2006/main" xmlns:r="http://schemas.openxmlformats.org/officeDocument/2006/relationships">
   <p:cSld>
     <p:bg>
       <p:bgPr>
         <a:solidFill>
           <a:srgbClr val="113C61"/>
         </a:solidFill>
-        <a:effectLst/>
       </p:bgPr>
     </p:bg>
     <p:spTree>
@@ -3483,13 +3551,13 @@
       </p:grpSpPr>
       <p:sp>
         <p:nvSpPr>
-          <p:cNvPr id="2" name="AutoShape 2"/>
+          <p:cNvPr name="AutoShape 2" id="2"/>
           <p:cNvSpPr/>
           <p:nvPr/>
         </p:nvSpPr>
         <p:spPr>
-          <a:xfrm>
-            <a:off x="-328219" y="-342900"/>
+          <a:xfrm rot="0">
+            <a:off x="-349001" y="-323850"/>
             <a:ext cx="17608301" cy="9582150"/>
           </a:xfrm>
           <a:prstGeom prst="rect">
@@ -3499,31 +3567,193 @@
             <a:srgbClr val="FFFFFF"/>
           </a:solidFill>
         </p:spPr>
-        <p:txBody>
-          <a:bodyPr/>
-          <a:lstStyle/>
-          <a:p>
-            <a:endParaRPr lang="pt-BR" dirty="0"/>
-          </a:p>
-        </p:txBody>
-      </p:sp>
-      <p:sp>
-        <p:nvSpPr>
-          <p:cNvPr id="3" name="TextBox 3"/>
-          <p:cNvSpPr txBox="1"/>
+      </p:sp>
+      <p:sp>
+        <p:nvSpPr>
+          <p:cNvPr name="AutoShape 3" id="3"/>
+          <p:cNvSpPr/>
           <p:nvPr/>
         </p:nvSpPr>
         <p:spPr>
-          <a:xfrm>
-            <a:off x="6059188" y="438150"/>
-            <a:ext cx="4791924" cy="1162050"/>
+          <a:xfrm rot="0">
+            <a:off x="357170" y="1600200"/>
+            <a:ext cx="152400" cy="6248400"/>
+          </a:xfrm>
+          <a:prstGeom prst="rect">
+            <a:avLst/>
+          </a:prstGeom>
+          <a:solidFill>
+            <a:srgbClr val="AE8441"/>
+          </a:solidFill>
+        </p:spPr>
+      </p:sp>
+      <p:pic>
+        <p:nvPicPr>
+          <p:cNvPr name="Picture 4" id="4"/>
+          <p:cNvPicPr>
+            <a:picLocks noChangeAspect="true"/>
+          </p:cNvPicPr>
+          <p:nvPr/>
+        </p:nvPicPr>
+        <p:blipFill>
+          <a:blip r:embed="rId2"/>
+          <a:srcRect l="0" t="0" r="0" b="0"/>
+          <a:stretch>
+            <a:fillRect/>
+          </a:stretch>
+        </p:blipFill>
+        <p:spPr>
+          <a:xfrm flipH="false" flipV="false" rot="0">
+            <a:off x="1454982" y="1800245"/>
+            <a:ext cx="2666980" cy="2666980"/>
           </a:xfrm>
           <a:prstGeom prst="rect">
             <a:avLst/>
           </a:prstGeom>
         </p:spPr>
-        <p:txBody>
-          <a:bodyPr lIns="0" tIns="0" rIns="0" bIns="0" rtlCol="0" anchor="t">
+      </p:pic>
+      <p:pic>
+        <p:nvPicPr>
+          <p:cNvPr name="Picture 5" id="5"/>
+          <p:cNvPicPr>
+            <a:picLocks noChangeAspect="true"/>
+          </p:cNvPicPr>
+          <p:nvPr/>
+        </p:nvPicPr>
+        <p:blipFill>
+          <a:blip r:embed="rId3"/>
+          <a:srcRect l="0" t="0" r="0" b="0"/>
+          <a:stretch>
+            <a:fillRect/>
+          </a:stretch>
+        </p:blipFill>
+        <p:spPr>
+          <a:xfrm flipH="false" flipV="false" rot="0">
+            <a:off x="5465088" y="1800245"/>
+            <a:ext cx="2666980" cy="2666980"/>
+          </a:xfrm>
+          <a:prstGeom prst="rect">
+            <a:avLst/>
+          </a:prstGeom>
+        </p:spPr>
+      </p:pic>
+      <p:pic>
+        <p:nvPicPr>
+          <p:cNvPr name="Picture 6" id="6"/>
+          <p:cNvPicPr>
+            <a:picLocks noChangeAspect="true"/>
+          </p:cNvPicPr>
+          <p:nvPr/>
+        </p:nvPicPr>
+        <p:blipFill>
+          <a:blip r:embed="rId4"/>
+          <a:srcRect l="0" t="0" r="0" b="0"/>
+          <a:stretch>
+            <a:fillRect/>
+          </a:stretch>
+        </p:blipFill>
+        <p:spPr>
+          <a:xfrm flipH="false" flipV="false" rot="0">
+            <a:off x="14047484" y="1800245"/>
+            <a:ext cx="2638907" cy="2666980"/>
+          </a:xfrm>
+          <a:prstGeom prst="rect">
+            <a:avLst/>
+          </a:prstGeom>
+        </p:spPr>
+      </p:pic>
+      <p:pic>
+        <p:nvPicPr>
+          <p:cNvPr name="Picture 7" id="7"/>
+          <p:cNvPicPr>
+            <a:picLocks noChangeAspect="true"/>
+          </p:cNvPicPr>
+          <p:nvPr/>
+        </p:nvPicPr>
+        <p:blipFill>
+          <a:blip r:embed="rId5"/>
+          <a:srcRect l="0" t="343" r="0" b="343"/>
+          <a:stretch>
+            <a:fillRect/>
+          </a:stretch>
+        </p:blipFill>
+        <p:spPr>
+          <a:xfrm flipH="false" flipV="false" rot="0">
+            <a:off x="9862393" y="5404417"/>
+            <a:ext cx="2712868" cy="2712868"/>
+          </a:xfrm>
+          <a:prstGeom prst="rect">
+            <a:avLst/>
+          </a:prstGeom>
+        </p:spPr>
+      </p:pic>
+      <p:pic>
+        <p:nvPicPr>
+          <p:cNvPr name="Picture 8" id="8"/>
+          <p:cNvPicPr>
+            <a:picLocks noChangeAspect="true"/>
+          </p:cNvPicPr>
+          <p:nvPr/>
+        </p:nvPicPr>
+        <p:blipFill>
+          <a:blip r:embed="rId6"/>
+          <a:srcRect l="0" t="0" r="0" b="0"/>
+          <a:stretch>
+            <a:fillRect/>
+          </a:stretch>
+        </p:blipFill>
+        <p:spPr>
+          <a:xfrm flipH="false" flipV="false" rot="0">
+            <a:off x="1518702" y="5404417"/>
+            <a:ext cx="2669092" cy="2669092"/>
+          </a:xfrm>
+          <a:prstGeom prst="rect">
+            <a:avLst/>
+          </a:prstGeom>
+        </p:spPr>
+      </p:pic>
+      <p:pic>
+        <p:nvPicPr>
+          <p:cNvPr name="Picture 9" id="9"/>
+          <p:cNvPicPr>
+            <a:picLocks noChangeAspect="true"/>
+          </p:cNvPicPr>
+          <p:nvPr/>
+        </p:nvPicPr>
+        <p:blipFill>
+          <a:blip r:embed="rId7"/>
+          <a:srcRect l="0" t="0" r="0" b="0"/>
+          <a:stretch>
+            <a:fillRect/>
+          </a:stretch>
+        </p:blipFill>
+        <p:spPr>
+          <a:xfrm flipH="false" flipV="false" rot="0">
+            <a:off x="9685391" y="1800245"/>
+            <a:ext cx="2666980" cy="2666980"/>
+          </a:xfrm>
+          <a:prstGeom prst="rect">
+            <a:avLst/>
+          </a:prstGeom>
+        </p:spPr>
+      </p:pic>
+      <p:sp>
+        <p:nvSpPr>
+          <p:cNvPr name="TextBox 10" id="10"/>
+          <p:cNvSpPr txBox="true"/>
+          <p:nvPr/>
+        </p:nvSpPr>
+        <p:spPr>
+          <a:xfrm rot="0">
+            <a:off x="6059188" y="438150"/>
+            <a:ext cx="4791924" cy="1162050"/>
+          </a:xfrm>
+          <a:prstGeom prst="rect">
+            <a:avLst/>
+          </a:prstGeom>
+        </p:spPr>
+        <p:txBody>
+          <a:bodyPr anchor="t" rtlCol="false" tIns="0" lIns="0" bIns="0" rIns="0">
             <a:spAutoFit/>
           </a:bodyPr>
           <a:lstStyle/>
@@ -3547,22 +3777,307 @@
       </p:sp>
       <p:sp>
         <p:nvSpPr>
-          <p:cNvPr id="4" name="AutoShape 4"/>
-          <p:cNvSpPr/>
+          <p:cNvPr name="TextBox 11" id="11"/>
+          <p:cNvSpPr txBox="true"/>
           <p:nvPr/>
         </p:nvSpPr>
         <p:spPr>
-          <a:xfrm>
-            <a:off x="1028700" y="1582800"/>
-            <a:ext cx="152400" cy="6248400"/>
+          <a:xfrm rot="0">
+            <a:off x="1518702" y="4747260"/>
+            <a:ext cx="2539540" cy="396240"/>
           </a:xfrm>
           <a:prstGeom prst="rect">
             <a:avLst/>
           </a:prstGeom>
-          <a:solidFill>
-            <a:srgbClr val="AE8441"/>
-          </a:solidFill>
         </p:spPr>
+        <p:txBody>
+          <a:bodyPr anchor="t" rtlCol="false" tIns="0" lIns="0" bIns="0" rIns="0">
+            <a:spAutoFit/>
+          </a:bodyPr>
+          <a:lstStyle/>
+          <a:p>
+            <a:pPr>
+              <a:lnSpc>
+                <a:spcPts val="3359"/>
+              </a:lnSpc>
+            </a:pPr>
+            <a:r>
+              <a:rPr lang="en-US" sz="2400" spc="264">
+                <a:solidFill>
+                  <a:srgbClr val="000000"/>
+                </a:solidFill>
+                <a:latin typeface="Sanchez Bold"/>
+              </a:rPr>
+              <a:t>JEAN SOUSA</a:t>
+            </a:r>
+          </a:p>
+        </p:txBody>
+      </p:sp>
+      <p:sp>
+        <p:nvSpPr>
+          <p:cNvPr name="TextBox 12" id="12"/>
+          <p:cNvSpPr txBox="true"/>
+          <p:nvPr/>
+        </p:nvSpPr>
+        <p:spPr>
+          <a:xfrm rot="0">
+            <a:off x="4469057" y="4747260"/>
+            <a:ext cx="4352671" cy="396240"/>
+          </a:xfrm>
+          <a:prstGeom prst="rect">
+            <a:avLst/>
+          </a:prstGeom>
+        </p:spPr>
+        <p:txBody>
+          <a:bodyPr anchor="t" rtlCol="false" tIns="0" lIns="0" bIns="0" rIns="0">
+            <a:spAutoFit/>
+          </a:bodyPr>
+          <a:lstStyle/>
+          <a:p>
+            <a:pPr>
+              <a:lnSpc>
+                <a:spcPts val="3359"/>
+              </a:lnSpc>
+            </a:pPr>
+            <a:r>
+              <a:rPr lang="en-US" sz="2400" spc="264">
+                <a:solidFill>
+                  <a:srgbClr val="000000"/>
+                </a:solidFill>
+                <a:latin typeface="Sanchez Bold"/>
+              </a:rPr>
+              <a:t>LEONARDO AMANCIO</a:t>
+            </a:r>
+          </a:p>
+        </p:txBody>
+      </p:sp>
+      <p:sp>
+        <p:nvSpPr>
+          <p:cNvPr name="TextBox 13" id="13"/>
+          <p:cNvSpPr txBox="true"/>
+          <p:nvPr/>
+        </p:nvSpPr>
+        <p:spPr>
+          <a:xfrm rot="0">
+            <a:off x="13190602" y="4686300"/>
+            <a:ext cx="4352671" cy="396240"/>
+          </a:xfrm>
+          <a:prstGeom prst="rect">
+            <a:avLst/>
+          </a:prstGeom>
+        </p:spPr>
+        <p:txBody>
+          <a:bodyPr anchor="t" rtlCol="false" tIns="0" lIns="0" bIns="0" rIns="0">
+            <a:spAutoFit/>
+          </a:bodyPr>
+          <a:lstStyle/>
+          <a:p>
+            <a:pPr>
+              <a:lnSpc>
+                <a:spcPts val="3359"/>
+              </a:lnSpc>
+            </a:pPr>
+            <a:r>
+              <a:rPr lang="en-US" sz="2400" spc="264">
+                <a:solidFill>
+                  <a:srgbClr val="000000"/>
+                </a:solidFill>
+                <a:latin typeface="Sanchez Bold"/>
+              </a:rPr>
+              <a:t>NICOLAS CARVALHO</a:t>
+            </a:r>
+          </a:p>
+        </p:txBody>
+      </p:sp>
+      <p:sp>
+        <p:nvSpPr>
+          <p:cNvPr name="TextBox 14" id="14"/>
+          <p:cNvSpPr txBox="true"/>
+          <p:nvPr/>
+        </p:nvSpPr>
+        <p:spPr>
+          <a:xfrm rot="0">
+            <a:off x="9187211" y="4747260"/>
+            <a:ext cx="3569219" cy="396240"/>
+          </a:xfrm>
+          <a:prstGeom prst="rect">
+            <a:avLst/>
+          </a:prstGeom>
+        </p:spPr>
+        <p:txBody>
+          <a:bodyPr anchor="t" rtlCol="false" tIns="0" lIns="0" bIns="0" rIns="0">
+            <a:spAutoFit/>
+          </a:bodyPr>
+          <a:lstStyle/>
+          <a:p>
+            <a:pPr>
+              <a:lnSpc>
+                <a:spcPts val="3359"/>
+              </a:lnSpc>
+            </a:pPr>
+            <a:r>
+              <a:rPr lang="en-US" sz="2400" spc="264">
+                <a:solidFill>
+                  <a:srgbClr val="000000"/>
+                </a:solidFill>
+                <a:latin typeface="Sanchez Bold"/>
+              </a:rPr>
+              <a:t>ISABELA VITORIA</a:t>
+            </a:r>
+          </a:p>
+        </p:txBody>
+      </p:sp>
+      <p:sp>
+        <p:nvSpPr>
+          <p:cNvPr name="TextBox 15" id="15"/>
+          <p:cNvSpPr txBox="true"/>
+          <p:nvPr/>
+        </p:nvSpPr>
+        <p:spPr>
+          <a:xfrm rot="0">
+            <a:off x="1202944" y="8340179"/>
+            <a:ext cx="3300607" cy="396240"/>
+          </a:xfrm>
+          <a:prstGeom prst="rect">
+            <a:avLst/>
+          </a:prstGeom>
+        </p:spPr>
+        <p:txBody>
+          <a:bodyPr anchor="t" rtlCol="false" tIns="0" lIns="0" bIns="0" rIns="0">
+            <a:spAutoFit/>
+          </a:bodyPr>
+          <a:lstStyle/>
+          <a:p>
+            <a:pPr>
+              <a:lnSpc>
+                <a:spcPts val="3359"/>
+              </a:lnSpc>
+            </a:pPr>
+            <a:r>
+              <a:rPr lang="en-US" sz="2400" spc="264">
+                <a:solidFill>
+                  <a:srgbClr val="000000"/>
+                </a:solidFill>
+                <a:latin typeface="Sanchez Bold"/>
+              </a:rPr>
+              <a:t>BRUNO RICARDO</a:t>
+            </a:r>
+          </a:p>
+        </p:txBody>
+      </p:sp>
+      <p:sp>
+        <p:nvSpPr>
+          <p:cNvPr name="TextBox 16" id="16"/>
+          <p:cNvSpPr txBox="true"/>
+          <p:nvPr/>
+        </p:nvSpPr>
+        <p:spPr>
+          <a:xfrm rot="0">
+            <a:off x="5465088" y="8340179"/>
+            <a:ext cx="3313143" cy="396240"/>
+          </a:xfrm>
+          <a:prstGeom prst="rect">
+            <a:avLst/>
+          </a:prstGeom>
+        </p:spPr>
+        <p:txBody>
+          <a:bodyPr anchor="t" rtlCol="false" tIns="0" lIns="0" bIns="0" rIns="0">
+            <a:spAutoFit/>
+          </a:bodyPr>
+          <a:lstStyle/>
+          <a:p>
+            <a:pPr>
+              <a:lnSpc>
+                <a:spcPts val="3359"/>
+              </a:lnSpc>
+            </a:pPr>
+            <a:r>
+              <a:rPr lang="en-US" sz="2400" spc="264">
+                <a:solidFill>
+                  <a:srgbClr val="000000"/>
+                </a:solidFill>
+                <a:latin typeface="Sanchez Bold"/>
+              </a:rPr>
+              <a:t>MATHIAS SOUZA</a:t>
+            </a:r>
+          </a:p>
+        </p:txBody>
+      </p:sp>
+      <p:sp>
+        <p:nvSpPr>
+          <p:cNvPr name="TextBox 17" id="17"/>
+          <p:cNvSpPr txBox="true"/>
+          <p:nvPr/>
+        </p:nvSpPr>
+        <p:spPr>
+          <a:xfrm rot="0">
+            <a:off x="9681224" y="8340179"/>
+            <a:ext cx="3075206" cy="396240"/>
+          </a:xfrm>
+          <a:prstGeom prst="rect">
+            <a:avLst/>
+          </a:prstGeom>
+        </p:spPr>
+        <p:txBody>
+          <a:bodyPr anchor="t" rtlCol="false" tIns="0" lIns="0" bIns="0" rIns="0">
+            <a:spAutoFit/>
+          </a:bodyPr>
+          <a:lstStyle/>
+          <a:p>
+            <a:pPr>
+              <a:lnSpc>
+                <a:spcPts val="3359"/>
+              </a:lnSpc>
+            </a:pPr>
+            <a:r>
+              <a:rPr lang="en-US" sz="2400" spc="264">
+                <a:solidFill>
+                  <a:srgbClr val="000000"/>
+                </a:solidFill>
+                <a:latin typeface="Sanchez Bold"/>
+              </a:rPr>
+              <a:t>JAILSON VITOR</a:t>
+            </a:r>
+          </a:p>
+        </p:txBody>
+      </p:sp>
+      <p:sp>
+        <p:nvSpPr>
+          <p:cNvPr name="TextBox 18" id="18"/>
+          <p:cNvSpPr txBox="true"/>
+          <p:nvPr/>
+        </p:nvSpPr>
+        <p:spPr>
+          <a:xfrm rot="0">
+            <a:off x="14192385" y="8340179"/>
+            <a:ext cx="2820688" cy="396240"/>
+          </a:xfrm>
+          <a:prstGeom prst="rect">
+            <a:avLst/>
+          </a:prstGeom>
+        </p:spPr>
+        <p:txBody>
+          <a:bodyPr anchor="t" rtlCol="false" tIns="0" lIns="0" bIns="0" rIns="0">
+            <a:spAutoFit/>
+          </a:bodyPr>
+          <a:lstStyle/>
+          <a:p>
+            <a:pPr>
+              <a:lnSpc>
+                <a:spcPts val="3359"/>
+              </a:lnSpc>
+            </a:pPr>
+            <a:r>
+              <a:rPr lang="en-US" sz="2399" spc="263">
+                <a:solidFill>
+                  <a:srgbClr val="000000"/>
+                </a:solidFill>
+                <a:latin typeface="Sanchez Bold"/>
+              </a:rPr>
+              <a:t>TALLES ARIEL</a:t>
+            </a:r>
+          </a:p>
+        </p:txBody>
       </p:sp>
     </p:spTree>
   </p:cSld>
@@ -3573,14 +4088,13 @@
 </file>
 
 <file path=ppt/slides/slide3.xml><?xml version="1.0" encoding="utf-8"?>
-<p:sld xmlns:a="http://schemas.openxmlformats.org/drawingml/2006/main" xmlns:r="http://schemas.openxmlformats.org/officeDocument/2006/relationships" xmlns:p="http://schemas.openxmlformats.org/presentationml/2006/main">
+<p:sld xmlns:p="http://schemas.openxmlformats.org/presentationml/2006/main" xmlns:a="http://schemas.openxmlformats.org/drawingml/2006/main" xmlns:r="http://schemas.openxmlformats.org/officeDocument/2006/relationships">
   <p:cSld>
     <p:bg>
       <p:bgPr>
         <a:solidFill>
           <a:srgbClr val="113C61"/>
         </a:solidFill>
-        <a:effectLst/>
       </p:bgPr>
     </p:bg>
     <p:spTree>
@@ -3599,12 +4113,12 @@
       </p:grpSpPr>
       <p:sp>
         <p:nvSpPr>
-          <p:cNvPr id="2" name="AutoShape 2"/>
+          <p:cNvPr name="AutoShape 2" id="2"/>
           <p:cNvSpPr/>
           <p:nvPr/>
         </p:nvSpPr>
         <p:spPr>
-          <a:xfrm>
+          <a:xfrm rot="0">
             <a:off x="-335735" y="-343317"/>
             <a:ext cx="4574360" cy="10973635"/>
           </a:xfrm>
@@ -3618,21 +4132,21 @@
       </p:sp>
       <p:pic>
         <p:nvPicPr>
-          <p:cNvPr id="3" name="Picture 3"/>
+          <p:cNvPr name="Picture 3" id="3"/>
           <p:cNvPicPr>
-            <a:picLocks noChangeAspect="1"/>
+            <a:picLocks noChangeAspect="true"/>
           </p:cNvPicPr>
           <p:nvPr/>
         </p:nvPicPr>
         <p:blipFill>
           <a:blip r:embed="rId2"/>
-          <a:srcRect l="11786" r="37354"/>
+          <a:srcRect l="11786" t="0" r="37354" b="0"/>
           <a:stretch>
             <a:fillRect/>
           </a:stretch>
         </p:blipFill>
         <p:spPr>
-          <a:xfrm>
+          <a:xfrm flipH="false" flipV="false" rot="0">
             <a:off x="432627" y="1252543"/>
             <a:ext cx="6278246" cy="8229600"/>
           </a:xfrm>
@@ -3643,12 +4157,12 @@
       </p:pic>
       <p:sp>
         <p:nvSpPr>
-          <p:cNvPr id="4" name="TextBox 4"/>
-          <p:cNvSpPr txBox="1"/>
+          <p:cNvPr name="TextBox 4" id="4"/>
+          <p:cNvSpPr txBox="true"/>
           <p:nvPr/>
         </p:nvSpPr>
         <p:spPr>
-          <a:xfrm>
+          <a:xfrm rot="0">
             <a:off x="8660678" y="236691"/>
             <a:ext cx="7281954" cy="1162050"/>
           </a:xfrm>
@@ -3657,7 +4171,7 @@
           </a:prstGeom>
         </p:spPr>
         <p:txBody>
-          <a:bodyPr lIns="0" tIns="0" rIns="0" bIns="0" rtlCol="0" anchor="t">
+          <a:bodyPr anchor="t" rtlCol="false" tIns="0" lIns="0" bIns="0" rIns="0">
             <a:spAutoFit/>
           </a:bodyPr>
           <a:lstStyle/>
@@ -3681,12 +4195,12 @@
       </p:sp>
       <p:sp>
         <p:nvSpPr>
-          <p:cNvPr id="5" name="TextBox 5"/>
-          <p:cNvSpPr txBox="1"/>
+          <p:cNvPr name="TextBox 5" id="5"/>
+          <p:cNvSpPr txBox="true"/>
           <p:nvPr/>
         </p:nvSpPr>
         <p:spPr>
-          <a:xfrm>
+          <a:xfrm rot="0">
             <a:off x="7344010" y="1749906"/>
             <a:ext cx="9915290" cy="7177725"/>
           </a:xfrm>
@@ -3695,7 +4209,7 @@
           </a:prstGeom>
         </p:spPr>
         <p:txBody>
-          <a:bodyPr lIns="0" tIns="0" rIns="0" bIns="0" rtlCol="0" anchor="t">
+          <a:bodyPr anchor="t" rtlCol="false" tIns="0" lIns="0" bIns="0" rIns="0">
             <a:spAutoFit/>
           </a:bodyPr>
           <a:lstStyle/>
@@ -3726,7 +4240,7 @@
 </file>
 
 <file path=ppt/slides/slide4.xml><?xml version="1.0" encoding="utf-8"?>
-<p:sld xmlns:a="http://schemas.openxmlformats.org/drawingml/2006/main" xmlns:r="http://schemas.openxmlformats.org/officeDocument/2006/relationships" xmlns:p="http://schemas.openxmlformats.org/presentationml/2006/main">
+<p:sld xmlns:p="http://schemas.openxmlformats.org/presentationml/2006/main" xmlns:a="http://schemas.openxmlformats.org/drawingml/2006/main" xmlns:r="http://schemas.openxmlformats.org/officeDocument/2006/relationships">
   <p:cSld>
     <p:spTree>
       <p:nvGrpSpPr>
@@ -3744,12 +4258,12 @@
       </p:grpSpPr>
       <p:sp>
         <p:nvSpPr>
-          <p:cNvPr id="2" name="AutoShape 2"/>
+          <p:cNvPr name="AutoShape 2" id="2"/>
           <p:cNvSpPr/>
           <p:nvPr/>
         </p:nvSpPr>
         <p:spPr>
-          <a:xfrm>
+          <a:xfrm rot="0">
             <a:off x="1028700" y="1163006"/>
             <a:ext cx="16230600" cy="9569201"/>
           </a:xfrm>
@@ -3763,21 +4277,21 @@
       </p:sp>
       <p:pic>
         <p:nvPicPr>
-          <p:cNvPr id="4" name="Picture 4"/>
+          <p:cNvPr name="Picture 3" id="3"/>
           <p:cNvPicPr>
-            <a:picLocks noChangeAspect="1"/>
+            <a:picLocks noChangeAspect="true"/>
           </p:cNvPicPr>
           <p:nvPr/>
         </p:nvPicPr>
         <p:blipFill>
           <a:blip r:embed="rId2"/>
-          <a:srcRect/>
+          <a:srcRect l="0" t="0" r="0" b="0"/>
           <a:stretch>
             <a:fillRect/>
           </a:stretch>
         </p:blipFill>
         <p:spPr>
-          <a:xfrm rot="-2359297">
+          <a:xfrm flipH="false" flipV="false" rot="-2359297">
             <a:off x="593185" y="618032"/>
             <a:ext cx="1434143" cy="1089949"/>
           </a:xfrm>
@@ -3786,23 +4300,48 @@
           </a:prstGeom>
         </p:spPr>
       </p:pic>
-      <p:sp>
-        <p:nvSpPr>
-          <p:cNvPr id="5" name="TextBox 5"/>
-          <p:cNvSpPr txBox="1"/>
+      <p:pic>
+        <p:nvPicPr>
+          <p:cNvPr name="Picture 4" id="4"/>
+          <p:cNvPicPr>
+            <a:picLocks noChangeAspect="true"/>
+          </p:cNvPicPr>
           <p:nvPr/>
-        </p:nvSpPr>
+        </p:nvPicPr>
+        <p:blipFill>
+          <a:blip r:embed="rId3"/>
+          <a:srcRect l="0" t="0" r="0" b="0"/>
+          <a:stretch>
+            <a:fillRect/>
+          </a:stretch>
+        </p:blipFill>
         <p:spPr>
-          <a:xfrm>
-            <a:off x="5525407" y="1448437"/>
-            <a:ext cx="7237185" cy="1162050"/>
+          <a:xfrm flipH="false" flipV="false" rot="0">
+            <a:off x="3520296" y="2995375"/>
+            <a:ext cx="11247409" cy="6262925"/>
           </a:xfrm>
           <a:prstGeom prst="rect">
             <a:avLst/>
           </a:prstGeom>
         </p:spPr>
-        <p:txBody>
-          <a:bodyPr lIns="0" tIns="0" rIns="0" bIns="0" rtlCol="0" anchor="t">
+      </p:pic>
+      <p:sp>
+        <p:nvSpPr>
+          <p:cNvPr name="TextBox 5" id="5"/>
+          <p:cNvSpPr txBox="true"/>
+          <p:nvPr/>
+        </p:nvSpPr>
+        <p:spPr>
+          <a:xfrm rot="0">
+            <a:off x="5525407" y="1448437"/>
+            <a:ext cx="7237185" cy="1162050"/>
+          </a:xfrm>
+          <a:prstGeom prst="rect">
+            <a:avLst/>
+          </a:prstGeom>
+        </p:spPr>
+        <p:txBody>
+          <a:bodyPr anchor="t" rtlCol="false" tIns="0" lIns="0" bIns="0" rIns="0">
             <a:spAutoFit/>
           </a:bodyPr>
           <a:lstStyle/>
@@ -3824,42 +4363,6 @@
           </a:p>
         </p:txBody>
       </p:sp>
-      <p:pic>
-        <p:nvPicPr>
-          <p:cNvPr id="7" name="Imagem 6">
-            <a:extLst>
-              <a:ext uri="{FF2B5EF4-FFF2-40B4-BE49-F238E27FC236}">
-                <a16:creationId xmlns:a16="http://schemas.microsoft.com/office/drawing/2014/main" id="{293607BD-50D5-48E7-9EBD-8F1FB9016A05}"/>
-              </a:ext>
-            </a:extLst>
-          </p:cNvPr>
-          <p:cNvPicPr>
-            <a:picLocks noChangeAspect="1"/>
-          </p:cNvPicPr>
-          <p:nvPr/>
-        </p:nvPicPr>
-        <p:blipFill>
-          <a:blip r:embed="rId3">
-            <a:extLst>
-              <a:ext uri="{28A0092B-C50C-407E-A947-70E740481C1C}">
-                <a14:useLocalDpi xmlns:a14="http://schemas.microsoft.com/office/drawing/2010/main" val="0"/>
-              </a:ext>
-            </a:extLst>
-          </a:blip>
-          <a:stretch>
-            <a:fillRect/>
-          </a:stretch>
-        </p:blipFill>
-        <p:spPr>
-          <a:xfrm>
-            <a:off x="3129337" y="2895918"/>
-            <a:ext cx="12029323" cy="6698321"/>
-          </a:xfrm>
-          <a:prstGeom prst="rect">
-            <a:avLst/>
-          </a:prstGeom>
-        </p:spPr>
-      </p:pic>
     </p:spTree>
   </p:cSld>
   <p:clrMapOvr>
@@ -3869,7 +4372,7 @@
 </file>
 
 <file path=ppt/slides/slide5.xml><?xml version="1.0" encoding="utf-8"?>
-<p:sld xmlns:a="http://schemas.openxmlformats.org/drawingml/2006/main" xmlns:r="http://schemas.openxmlformats.org/officeDocument/2006/relationships" xmlns:p="http://schemas.openxmlformats.org/presentationml/2006/main">
+<p:sld xmlns:p="http://schemas.openxmlformats.org/presentationml/2006/main" xmlns:a="http://schemas.openxmlformats.org/drawingml/2006/main" xmlns:r="http://schemas.openxmlformats.org/officeDocument/2006/relationships">
   <p:cSld>
     <p:spTree>
       <p:nvGrpSpPr>
@@ -3887,12 +4390,12 @@
       </p:grpSpPr>
       <p:sp>
         <p:nvSpPr>
-          <p:cNvPr id="2" name="AutoShape 2"/>
+          <p:cNvPr name="AutoShape 2" id="2"/>
           <p:cNvSpPr/>
           <p:nvPr/>
         </p:nvSpPr>
         <p:spPr>
-          <a:xfrm>
+          <a:xfrm rot="0">
             <a:off x="2729839" y="359394"/>
             <a:ext cx="16230600" cy="9569201"/>
           </a:xfrm>
@@ -3906,21 +4409,21 @@
       </p:sp>
       <p:pic>
         <p:nvPicPr>
-          <p:cNvPr id="3" name="Picture 3"/>
+          <p:cNvPr name="Picture 3" id="3"/>
           <p:cNvPicPr>
-            <a:picLocks noChangeAspect="1"/>
+            <a:picLocks noChangeAspect="true"/>
           </p:cNvPicPr>
           <p:nvPr/>
         </p:nvPicPr>
         <p:blipFill>
           <a:blip r:embed="rId2"/>
-          <a:srcRect l="12998" r="12998"/>
+          <a:srcRect l="12998" t="0" r="12998" b="0"/>
           <a:stretch>
             <a:fillRect/>
           </a:stretch>
         </p:blipFill>
         <p:spPr>
-          <a:xfrm>
+          <a:xfrm flipH="false" flipV="false" rot="0">
             <a:off x="1364395" y="1029194"/>
             <a:ext cx="6116867" cy="8229600"/>
           </a:xfrm>
@@ -3929,86 +4432,33 @@
           </a:prstGeom>
         </p:spPr>
       </p:pic>
-      <p:grpSp>
-        <p:nvGrpSpPr>
-          <p:cNvPr id="4" name="Group 4"/>
-          <p:cNvGrpSpPr/>
+      <p:sp>
+        <p:nvSpPr>
+          <p:cNvPr name="AutoShape 4" id="4"/>
+          <p:cNvSpPr/>
           <p:nvPr/>
-        </p:nvGrpSpPr>
-        <p:grpSpPr>
-          <a:xfrm>
-            <a:off x="424323" y="359394"/>
+        </p:nvSpPr>
+        <p:spPr>
+          <a:xfrm rot="0">
+            <a:off x="692935" y="773573"/>
             <a:ext cx="6175193" cy="3114359"/>
-            <a:chOff x="0" y="0"/>
-            <a:chExt cx="8233590" cy="4152478"/>
-          </a:xfrm>
-        </p:grpSpPr>
-        <p:sp>
-          <p:nvSpPr>
-            <p:cNvPr id="5" name="AutoShape 5"/>
-            <p:cNvSpPr/>
-            <p:nvPr/>
-          </p:nvSpPr>
-          <p:spPr>
-            <a:xfrm>
-              <a:off x="0" y="0"/>
-              <a:ext cx="8233590" cy="4152478"/>
-            </a:xfrm>
-            <a:prstGeom prst="rect">
-              <a:avLst/>
-            </a:prstGeom>
-            <a:solidFill>
-              <a:srgbClr val="113C61"/>
-            </a:solidFill>
-          </p:spPr>
-        </p:sp>
-        <p:sp>
-          <p:nvSpPr>
-            <p:cNvPr id="6" name="TextBox 6"/>
-            <p:cNvSpPr txBox="1"/>
-            <p:nvPr/>
-          </p:nvSpPr>
-          <p:spPr>
-            <a:xfrm>
-              <a:off x="609795" y="533189"/>
-              <a:ext cx="7014000" cy="3067050"/>
-            </a:xfrm>
-            <a:prstGeom prst="rect">
-              <a:avLst/>
-            </a:prstGeom>
-          </p:spPr>
-          <p:txBody>
-            <a:bodyPr lIns="0" tIns="0" rIns="0" bIns="0" rtlCol="0" anchor="t">
-              <a:spAutoFit/>
-            </a:bodyPr>
-            <a:lstStyle/>
-            <a:p>
-              <a:pPr algn="l">
-                <a:lnSpc>
-                  <a:spcPts val="9000"/>
-                </a:lnSpc>
-              </a:pPr>
-              <a:r>
-                <a:rPr lang="en-US" sz="7500" spc="150">
-                  <a:solidFill>
-                    <a:srgbClr val="FFFFFF"/>
-                  </a:solidFill>
-                  <a:latin typeface="Josefin Slab"/>
-                </a:rPr>
-                <a:t>Estratégia de Marca</a:t>
-              </a:r>
-            </a:p>
-          </p:txBody>
-        </p:sp>
-      </p:grpSp>
-      <p:sp>
-        <p:nvSpPr>
-          <p:cNvPr id="7" name="TextBox 7"/>
-          <p:cNvSpPr txBox="1"/>
+          </a:xfrm>
+          <a:prstGeom prst="rect">
+            <a:avLst/>
+          </a:prstGeom>
+          <a:solidFill>
+            <a:srgbClr val="113C61"/>
+          </a:solidFill>
+        </p:spPr>
+      </p:sp>
+      <p:sp>
+        <p:nvSpPr>
+          <p:cNvPr name="TextBox 5" id="5"/>
+          <p:cNvSpPr txBox="true"/>
           <p:nvPr/>
         </p:nvSpPr>
         <p:spPr>
-          <a:xfrm>
+          <a:xfrm rot="0">
             <a:off x="9144000" y="754523"/>
             <a:ext cx="7237185" cy="1162050"/>
           </a:xfrm>
@@ -4017,7 +4467,7 @@
           </a:prstGeom>
         </p:spPr>
         <p:txBody>
-          <a:bodyPr lIns="0" tIns="0" rIns="0" bIns="0" rtlCol="0" anchor="t">
+          <a:bodyPr anchor="t" rtlCol="false" tIns="0" lIns="0" bIns="0" rIns="0">
             <a:spAutoFit/>
           </a:bodyPr>
           <a:lstStyle/>
@@ -4041,12 +4491,12 @@
       </p:sp>
       <p:sp>
         <p:nvSpPr>
-          <p:cNvPr id="8" name="TextBox 8"/>
-          <p:cNvSpPr txBox="1"/>
+          <p:cNvPr name="TextBox 6" id="6"/>
+          <p:cNvSpPr txBox="true"/>
           <p:nvPr/>
         </p:nvSpPr>
         <p:spPr>
-          <a:xfrm>
+          <a:xfrm rot="0">
             <a:off x="8562007" y="2198853"/>
             <a:ext cx="8983147" cy="6861302"/>
           </a:xfrm>
@@ -4055,7 +4505,7 @@
           </a:prstGeom>
         </p:spPr>
         <p:txBody>
-          <a:bodyPr lIns="0" tIns="0" rIns="0" bIns="0" rtlCol="0" anchor="t">
+          <a:bodyPr anchor="t" rtlCol="false" tIns="0" lIns="0" bIns="0" rIns="0">
             <a:spAutoFit/>
           </a:bodyPr>
           <a:lstStyle/>
@@ -4073,6 +4523,47 @@
                 <a:latin typeface="Josefin Slab"/>
               </a:rPr>
               <a:t>blablablablablablablablablablablablablablablablablablablablablablablablablablablablablablablablablablablablablablablablablablablablablablablablablablablablablablablabla</a:t>
+            </a:r>
+          </a:p>
+        </p:txBody>
+      </p:sp>
+      <p:sp>
+        <p:nvSpPr>
+          <p:cNvPr name="TextBox 7" id="7"/>
+          <p:cNvSpPr txBox="true"/>
+          <p:nvPr/>
+        </p:nvSpPr>
+        <p:spPr>
+          <a:xfrm rot="0">
+            <a:off x="692935" y="1518527"/>
+            <a:ext cx="6175193" cy="1162050"/>
+          </a:xfrm>
+          <a:prstGeom prst="rect">
+            <a:avLst/>
+          </a:prstGeom>
+        </p:spPr>
+        <p:txBody>
+          <a:bodyPr anchor="t" rtlCol="false" tIns="0" lIns="0" bIns="0" rIns="0">
+            <a:spAutoFit/>
+          </a:bodyPr>
+          <a:lstStyle/>
+          <a:p>
+            <a:pPr algn="ctr">
+              <a:lnSpc>
+                <a:spcPts val="9000"/>
+              </a:lnSpc>
+              <a:spcBef>
+                <a:spcPct val="0"/>
+              </a:spcBef>
+            </a:pPr>
+            <a:r>
+              <a:rPr lang="en-US" sz="7500" spc="150">
+                <a:solidFill>
+                  <a:srgbClr val="FFFFFF"/>
+                </a:solidFill>
+                <a:latin typeface="Josefin Slab"/>
+              </a:rPr>
+              <a:t>tssadsad</a:t>
             </a:r>
           </a:p>
         </p:txBody>
@@ -4086,7 +4577,7 @@
 </file>
 
 <file path=ppt/slides/slide6.xml><?xml version="1.0" encoding="utf-8"?>
-<p:sld xmlns:a="http://schemas.openxmlformats.org/drawingml/2006/main" xmlns:r="http://schemas.openxmlformats.org/officeDocument/2006/relationships" xmlns:p="http://schemas.openxmlformats.org/presentationml/2006/main">
+<p:sld xmlns:p="http://schemas.openxmlformats.org/presentationml/2006/main" xmlns:a="http://schemas.openxmlformats.org/drawingml/2006/main" xmlns:r="http://schemas.openxmlformats.org/officeDocument/2006/relationships">
   <p:cSld>
     <p:spTree>
       <p:nvGrpSpPr>
@@ -4104,12 +4595,12 @@
       </p:grpSpPr>
       <p:grpSp>
         <p:nvGrpSpPr>
-          <p:cNvPr id="2" name="Group 2"/>
+          <p:cNvPr name="Group 2" id="2"/>
           <p:cNvGrpSpPr/>
           <p:nvPr/>
         </p:nvGrpSpPr>
         <p:grpSpPr>
-          <a:xfrm>
+          <a:xfrm rot="0">
             <a:off x="-304052" y="1028700"/>
             <a:ext cx="16426395" cy="2862047"/>
             <a:chOff x="0" y="0"/>
@@ -4118,12 +4609,12 @@
         </p:grpSpPr>
         <p:sp>
           <p:nvSpPr>
-            <p:cNvPr id="3" name="AutoShape 3"/>
+            <p:cNvPr name="AutoShape 3" id="3"/>
             <p:cNvSpPr/>
             <p:nvPr/>
           </p:nvSpPr>
           <p:spPr>
-            <a:xfrm>
+            <a:xfrm rot="0">
               <a:off x="0" y="0"/>
               <a:ext cx="21901860" cy="3816062"/>
             </a:xfrm>
@@ -4137,12 +4628,12 @@
         </p:sp>
         <p:sp>
           <p:nvSpPr>
-            <p:cNvPr id="4" name="TextBox 4"/>
-            <p:cNvSpPr txBox="1"/>
+            <p:cNvPr name="TextBox 4" id="4"/>
+            <p:cNvSpPr txBox="true"/>
             <p:nvPr/>
           </p:nvSpPr>
           <p:spPr>
-            <a:xfrm>
+            <a:xfrm rot="0">
               <a:off x="1777002" y="667250"/>
               <a:ext cx="19437593" cy="1543050"/>
             </a:xfrm>
@@ -4151,7 +4642,7 @@
             </a:prstGeom>
           </p:spPr>
           <p:txBody>
-            <a:bodyPr lIns="0" tIns="0" rIns="0" bIns="0" rtlCol="0" anchor="t">
+            <a:bodyPr anchor="t" rtlCol="false" tIns="0" lIns="0" bIns="0" rIns="0">
               <a:spAutoFit/>
             </a:bodyPr>
             <a:lstStyle/>
@@ -4175,12 +4666,12 @@
         </p:sp>
         <p:sp>
           <p:nvSpPr>
-            <p:cNvPr id="5" name="TextBox 5"/>
-            <p:cNvSpPr txBox="1"/>
+            <p:cNvPr name="TextBox 5" id="5"/>
+            <p:cNvSpPr txBox="true"/>
             <p:nvPr/>
           </p:nvSpPr>
           <p:spPr>
-            <a:xfrm>
+            <a:xfrm rot="0">
               <a:off x="1777002" y="2433690"/>
               <a:ext cx="19437593" cy="696819"/>
             </a:xfrm>
@@ -4189,7 +4680,7 @@
             </a:prstGeom>
           </p:spPr>
           <p:txBody>
-            <a:bodyPr lIns="0" tIns="0" rIns="0" bIns="0" rtlCol="0" anchor="t">
+            <a:bodyPr anchor="t" rtlCol="false" tIns="0" lIns="0" bIns="0" rIns="0">
               <a:spAutoFit/>
             </a:bodyPr>
             <a:lstStyle/>
@@ -4214,21 +4705,21 @@
       </p:grpSp>
       <p:pic>
         <p:nvPicPr>
-          <p:cNvPr id="6" name="Picture 6"/>
+          <p:cNvPr name="Picture 6" id="6"/>
           <p:cNvPicPr>
-            <a:picLocks noChangeAspect="1"/>
+            <a:picLocks noChangeAspect="true"/>
           </p:cNvPicPr>
           <p:nvPr/>
         </p:nvPicPr>
         <p:blipFill>
           <a:blip r:embed="rId2"/>
-          <a:srcRect/>
+          <a:srcRect l="0" t="0" r="0" b="0"/>
           <a:stretch>
             <a:fillRect/>
           </a:stretch>
         </p:blipFill>
         <p:spPr>
-          <a:xfrm>
+          <a:xfrm flipH="false" flipV="false" rot="0">
             <a:off x="3185570" y="5438210"/>
             <a:ext cx="1966057" cy="1966057"/>
           </a:xfrm>
@@ -4239,21 +4730,21 @@
       </p:pic>
       <p:pic>
         <p:nvPicPr>
-          <p:cNvPr id="7" name="Picture 7"/>
+          <p:cNvPr name="Picture 7" id="7"/>
           <p:cNvPicPr>
-            <a:picLocks noChangeAspect="1"/>
+            <a:picLocks noChangeAspect="true"/>
           </p:cNvPicPr>
           <p:nvPr/>
         </p:nvPicPr>
         <p:blipFill>
           <a:blip r:embed="rId3"/>
-          <a:srcRect/>
+          <a:srcRect l="0" t="0" r="0" b="0"/>
           <a:stretch>
             <a:fillRect/>
           </a:stretch>
         </p:blipFill>
         <p:spPr>
-          <a:xfrm>
+          <a:xfrm flipH="false" flipV="false" rot="0">
             <a:off x="7192849" y="5024100"/>
             <a:ext cx="2380167" cy="2380167"/>
           </a:xfrm>
@@ -4264,21 +4755,21 @@
       </p:pic>
       <p:pic>
         <p:nvPicPr>
-          <p:cNvPr id="8" name="Picture 8"/>
+          <p:cNvPr name="Picture 8" id="8"/>
           <p:cNvPicPr>
-            <a:picLocks noChangeAspect="1"/>
+            <a:picLocks noChangeAspect="true"/>
           </p:cNvPicPr>
           <p:nvPr/>
         </p:nvPicPr>
         <p:blipFill>
           <a:blip r:embed="rId4"/>
-          <a:srcRect/>
+          <a:srcRect l="0" t="0" r="0" b="0"/>
           <a:stretch>
             <a:fillRect/>
           </a:stretch>
         </p:blipFill>
         <p:spPr>
-          <a:xfrm>
+          <a:xfrm flipH="false" flipV="false" rot="0">
             <a:off x="12065155" y="5438210"/>
             <a:ext cx="2189900" cy="2189900"/>
           </a:xfrm>
@@ -4296,14 +4787,13 @@
 </file>
 
 <file path=ppt/slides/slide7.xml><?xml version="1.0" encoding="utf-8"?>
-<p:sld xmlns:a="http://schemas.openxmlformats.org/drawingml/2006/main" xmlns:r="http://schemas.openxmlformats.org/officeDocument/2006/relationships" xmlns:p="http://schemas.openxmlformats.org/presentationml/2006/main">
+<p:sld xmlns:p="http://schemas.openxmlformats.org/presentationml/2006/main" xmlns:a="http://schemas.openxmlformats.org/drawingml/2006/main">
   <p:cSld>
     <p:bg>
       <p:bgPr>
         <a:solidFill>
           <a:srgbClr val="113C61"/>
         </a:solidFill>
-        <a:effectLst/>
       </p:bgPr>
     </p:bg>
     <p:spTree>
@@ -4322,12 +4812,12 @@
       </p:grpSpPr>
       <p:sp>
         <p:nvSpPr>
-          <p:cNvPr id="2" name="AutoShape 2"/>
+          <p:cNvPr name="AutoShape 2" id="2"/>
           <p:cNvSpPr/>
           <p:nvPr/>
         </p:nvSpPr>
         <p:spPr>
-          <a:xfrm>
+          <a:xfrm rot="0">
             <a:off x="-360123" y="-300189"/>
             <a:ext cx="19008246" cy="4335803"/>
           </a:xfrm>
@@ -4341,21 +4831,21 @@
       </p:sp>
       <p:sp>
         <p:nvSpPr>
-          <p:cNvPr id="3" name="TextBox 3"/>
-          <p:cNvSpPr txBox="1"/>
+          <p:cNvPr name="TextBox 3" id="3"/>
+          <p:cNvSpPr txBox="true"/>
           <p:nvPr/>
         </p:nvSpPr>
         <p:spPr>
-          <a:xfrm>
-            <a:off x="1793565" y="0"/>
-            <a:ext cx="14700869" cy="1162050"/>
+          <a:xfrm rot="0">
+            <a:off x="6053092" y="2873564"/>
+            <a:ext cx="5538869" cy="2305050"/>
           </a:xfrm>
           <a:prstGeom prst="rect">
             <a:avLst/>
           </a:prstGeom>
         </p:spPr>
         <p:txBody>
-          <a:bodyPr lIns="0" tIns="0" rIns="0" bIns="0" rtlCol="0" anchor="t">
+          <a:bodyPr anchor="t" rtlCol="false" tIns="0" lIns="0" bIns="0" rIns="0">
             <a:spAutoFit/>
           </a:bodyPr>
           <a:lstStyle/>
@@ -4366,7 +4856,7 @@
               </a:lnSpc>
             </a:pPr>
             <a:r>
-              <a:rPr lang="en-US" sz="7500" spc="150" dirty="0">
+              <a:rPr lang="en-US" sz="7500" spc="150">
                 <a:solidFill>
                   <a:srgbClr val="113C61"/>
                 </a:solidFill>
@@ -4375,20 +4865,14 @@
               <a:t>Site </a:t>
             </a:r>
             <a:r>
-              <a:rPr lang="en-US" sz="7500" spc="150" dirty="0" err="1">
+              <a:rPr lang="en-US" sz="7500" spc="150">
                 <a:solidFill>
-                  <a:srgbClr val="113C61"/>
+                  <a:srgbClr val="FFFFFF"/>
                 </a:solidFill>
                 <a:latin typeface="Josefin Slab"/>
               </a:rPr>
-              <a:t>Institusional</a:t>
-            </a:r>
-            <a:endParaRPr lang="en-US" sz="7500" spc="150" dirty="0">
-              <a:solidFill>
-                <a:srgbClr val="113C61"/>
-              </a:solidFill>
-              <a:latin typeface="Josefin Slab"/>
-            </a:endParaRPr>
+              <a:t>Institucional</a:t>
+            </a:r>
           </a:p>
         </p:txBody>
       </p:sp>
@@ -4401,14 +4885,13 @@
 </file>
 
 <file path=ppt/slides/slide8.xml><?xml version="1.0" encoding="utf-8"?>
-<p:sld xmlns:a="http://schemas.openxmlformats.org/drawingml/2006/main" xmlns:r="http://schemas.openxmlformats.org/officeDocument/2006/relationships" xmlns:p="http://schemas.openxmlformats.org/presentationml/2006/main">
+<p:sld xmlns:p="http://schemas.openxmlformats.org/presentationml/2006/main" xmlns:a="http://schemas.openxmlformats.org/drawingml/2006/main" xmlns:r="http://schemas.openxmlformats.org/officeDocument/2006/relationships">
   <p:cSld>
     <p:bg>
       <p:bgPr>
         <a:solidFill>
           <a:srgbClr val="113C61"/>
         </a:solidFill>
-        <a:effectLst/>
       </p:bgPr>
     </p:bg>
     <p:spTree>
@@ -4427,12 +4910,12 @@
       </p:grpSpPr>
       <p:grpSp>
         <p:nvGrpSpPr>
-          <p:cNvPr id="2" name="Group 2"/>
+          <p:cNvPr name="Group 2" id="2"/>
           <p:cNvGrpSpPr/>
           <p:nvPr/>
         </p:nvGrpSpPr>
         <p:grpSpPr>
-          <a:xfrm>
+          <a:xfrm rot="0">
             <a:off x="0" y="2037213"/>
             <a:ext cx="8563923" cy="8249787"/>
             <a:chOff x="0" y="0"/>
@@ -4441,12 +4924,12 @@
         </p:grpSpPr>
         <p:sp>
           <p:nvSpPr>
-            <p:cNvPr id="3" name="TextBox 3"/>
-            <p:cNvSpPr txBox="1"/>
+            <p:cNvPr name="TextBox 3" id="3"/>
+            <p:cNvSpPr txBox="true"/>
             <p:nvPr/>
           </p:nvSpPr>
           <p:spPr>
-            <a:xfrm>
+            <a:xfrm rot="0">
               <a:off x="1321362" y="10473857"/>
               <a:ext cx="2019440" cy="525860"/>
             </a:xfrm>
@@ -4455,7 +4938,7 @@
             </a:prstGeom>
           </p:spPr>
           <p:txBody>
-            <a:bodyPr lIns="0" tIns="0" rIns="0" bIns="0" rtlCol="0" anchor="t">
+            <a:bodyPr anchor="t" rtlCol="false" tIns="0" lIns="0" bIns="0" rIns="0">
               <a:spAutoFit/>
             </a:bodyPr>
             <a:lstStyle/>
@@ -4479,12 +4962,12 @@
         </p:sp>
         <p:sp>
           <p:nvSpPr>
-            <p:cNvPr id="4" name="TextBox 4"/>
-            <p:cNvSpPr txBox="1"/>
+            <p:cNvPr name="TextBox 4" id="4"/>
+            <p:cNvSpPr txBox="true"/>
             <p:nvPr/>
           </p:nvSpPr>
           <p:spPr>
-            <a:xfrm>
+            <a:xfrm rot="0">
               <a:off x="3340802" y="10473857"/>
               <a:ext cx="2019440" cy="525860"/>
             </a:xfrm>
@@ -4493,7 +4976,7 @@
             </a:prstGeom>
           </p:spPr>
           <p:txBody>
-            <a:bodyPr lIns="0" tIns="0" rIns="0" bIns="0" rtlCol="0" anchor="t">
+            <a:bodyPr anchor="t" rtlCol="false" tIns="0" lIns="0" bIns="0" rIns="0">
               <a:spAutoFit/>
             </a:bodyPr>
             <a:lstStyle/>
@@ -4517,12 +5000,12 @@
         </p:sp>
         <p:sp>
           <p:nvSpPr>
-            <p:cNvPr id="5" name="TextBox 5"/>
-            <p:cNvSpPr txBox="1"/>
+            <p:cNvPr name="TextBox 5" id="5"/>
+            <p:cNvSpPr txBox="true"/>
             <p:nvPr/>
           </p:nvSpPr>
           <p:spPr>
-            <a:xfrm>
+            <a:xfrm rot="0">
               <a:off x="5360243" y="10473857"/>
               <a:ext cx="2019440" cy="525860"/>
             </a:xfrm>
@@ -4531,7 +5014,7 @@
             </a:prstGeom>
           </p:spPr>
           <p:txBody>
-            <a:bodyPr lIns="0" tIns="0" rIns="0" bIns="0" rtlCol="0" anchor="t">
+            <a:bodyPr anchor="t" rtlCol="false" tIns="0" lIns="0" bIns="0" rIns="0">
               <a:spAutoFit/>
             </a:bodyPr>
             <a:lstStyle/>
@@ -4555,12 +5038,12 @@
         </p:sp>
         <p:sp>
           <p:nvSpPr>
-            <p:cNvPr id="6" name="TextBox 6"/>
-            <p:cNvSpPr txBox="1"/>
+            <p:cNvPr name="TextBox 6" id="6"/>
+            <p:cNvSpPr txBox="true"/>
             <p:nvPr/>
           </p:nvSpPr>
           <p:spPr>
-            <a:xfrm>
+            <a:xfrm rot="0">
               <a:off x="7379683" y="10473857"/>
               <a:ext cx="2019440" cy="525860"/>
             </a:xfrm>
@@ -4569,7 +5052,7 @@
             </a:prstGeom>
           </p:spPr>
           <p:txBody>
-            <a:bodyPr lIns="0" tIns="0" rIns="0" bIns="0" rtlCol="0" anchor="t">
+            <a:bodyPr anchor="t" rtlCol="false" tIns="0" lIns="0" bIns="0" rIns="0">
               <a:spAutoFit/>
             </a:bodyPr>
             <a:lstStyle/>
@@ -4593,12 +5076,12 @@
         </p:sp>
         <p:sp>
           <p:nvSpPr>
-            <p:cNvPr id="7" name="TextBox 7"/>
-            <p:cNvSpPr txBox="1"/>
+            <p:cNvPr name="TextBox 7" id="7"/>
+            <p:cNvSpPr txBox="true"/>
             <p:nvPr/>
           </p:nvSpPr>
           <p:spPr>
-            <a:xfrm>
+            <a:xfrm rot="0">
               <a:off x="9399123" y="10473857"/>
               <a:ext cx="2019440" cy="525860"/>
             </a:xfrm>
@@ -4607,7 +5090,7 @@
             </a:prstGeom>
           </p:spPr>
           <p:txBody>
-            <a:bodyPr lIns="0" tIns="0" rIns="0" bIns="0" rtlCol="0" anchor="t">
+            <a:bodyPr anchor="t" rtlCol="false" tIns="0" lIns="0" bIns="0" rIns="0">
               <a:spAutoFit/>
             </a:bodyPr>
             <a:lstStyle/>
@@ -4631,14 +5114,14 @@
         </p:sp>
         <p:grpSp>
           <p:nvGrpSpPr>
-            <p:cNvPr id="8" name="Group 8"/>
+            <p:cNvPr name="Group 8" id="8"/>
             <p:cNvGrpSpPr>
-              <a:grpSpLocks noChangeAspect="1"/>
+              <a:grpSpLocks noChangeAspect="true"/>
             </p:cNvGrpSpPr>
             <p:nvPr/>
           </p:nvGrpSpPr>
           <p:grpSpPr>
-            <a:xfrm>
+            <a:xfrm rot="0">
               <a:off x="1321362" y="234355"/>
               <a:ext cx="10097201" cy="10097201"/>
               <a:chOff x="0" y="0"/>
@@ -4647,7 +5130,7 @@
           </p:grpSpPr>
           <p:sp>
             <p:nvSpPr>
-              <p:cNvPr id="9" name="Freeform 9"/>
+              <p:cNvPr name="Freeform 9" id="9"/>
               <p:cNvSpPr/>
               <p:nvPr/>
             </p:nvSpPr>
@@ -4661,9 +5144,9 @@
                 <a:gdLst/>
                 <a:ahLst/>
                 <a:cxnLst/>
-                <a:rect l="l" t="t" r="r" b="b"/>
+                <a:rect r="r" b="b" t="t" l="l"/>
                 <a:pathLst>
-                  <a:path w="10287000" h="12700">
+                  <a:path h="12700" w="10287000">
                     <a:moveTo>
                       <a:pt x="0" y="0"/>
                     </a:moveTo>
@@ -4687,7 +5170,7 @@
           </p:sp>
           <p:sp>
             <p:nvSpPr>
-              <p:cNvPr id="10" name="Freeform 10"/>
+              <p:cNvPr name="Freeform 10" id="10"/>
               <p:cNvSpPr/>
               <p:nvPr/>
             </p:nvSpPr>
@@ -4701,9 +5184,9 @@
                 <a:gdLst/>
                 <a:ahLst/>
                 <a:cxnLst/>
-                <a:rect l="l" t="t" r="r" b="b"/>
+                <a:rect r="r" b="b" t="t" l="l"/>
                 <a:pathLst>
-                  <a:path w="10287000" h="12700">
+                  <a:path h="12700" w="10287000">
                     <a:moveTo>
                       <a:pt x="0" y="0"/>
                     </a:moveTo>
@@ -4727,7 +5210,7 @@
           </p:sp>
           <p:sp>
             <p:nvSpPr>
-              <p:cNvPr id="11" name="Freeform 11"/>
+              <p:cNvPr name="Freeform 11" id="11"/>
               <p:cNvSpPr/>
               <p:nvPr/>
             </p:nvSpPr>
@@ -4741,9 +5224,9 @@
                 <a:gdLst/>
                 <a:ahLst/>
                 <a:cxnLst/>
-                <a:rect l="l" t="t" r="r" b="b"/>
+                <a:rect r="r" b="b" t="t" l="l"/>
                 <a:pathLst>
-                  <a:path w="10287000" h="12700">
+                  <a:path h="12700" w="10287000">
                     <a:moveTo>
                       <a:pt x="0" y="0"/>
                     </a:moveTo>
@@ -4767,7 +5250,7 @@
           </p:sp>
           <p:sp>
             <p:nvSpPr>
-              <p:cNvPr id="12" name="Freeform 12"/>
+              <p:cNvPr name="Freeform 12" id="12"/>
               <p:cNvSpPr/>
               <p:nvPr/>
             </p:nvSpPr>
@@ -4781,9 +5264,9 @@
                 <a:gdLst/>
                 <a:ahLst/>
                 <a:cxnLst/>
-                <a:rect l="l" t="t" r="r" b="b"/>
+                <a:rect r="r" b="b" t="t" l="l"/>
                 <a:pathLst>
-                  <a:path w="10287000" h="12700">
+                  <a:path h="12700" w="10287000">
                     <a:moveTo>
                       <a:pt x="0" y="0"/>
                     </a:moveTo>
@@ -4807,7 +5290,7 @@
           </p:sp>
           <p:sp>
             <p:nvSpPr>
-              <p:cNvPr id="13" name="Freeform 13"/>
+              <p:cNvPr name="Freeform 13" id="13"/>
               <p:cNvSpPr/>
               <p:nvPr/>
             </p:nvSpPr>
@@ -4821,9 +5304,9 @@
                 <a:gdLst/>
                 <a:ahLst/>
                 <a:cxnLst/>
-                <a:rect l="l" t="t" r="r" b="b"/>
+                <a:rect r="r" b="b" t="t" l="l"/>
                 <a:pathLst>
-                  <a:path w="10287000" h="12700">
+                  <a:path h="12700" w="10287000">
                     <a:moveTo>
                       <a:pt x="0" y="0"/>
                     </a:moveTo>
@@ -4848,12 +5331,12 @@
         </p:grpSp>
         <p:sp>
           <p:nvSpPr>
-            <p:cNvPr id="14" name="TextBox 14"/>
-            <p:cNvSpPr txBox="1"/>
+            <p:cNvPr name="TextBox 14" id="14"/>
+            <p:cNvSpPr txBox="true"/>
             <p:nvPr/>
           </p:nvSpPr>
           <p:spPr>
-            <a:xfrm>
+            <a:xfrm rot="0">
               <a:off x="0" y="-57150"/>
               <a:ext cx="1121911" cy="525860"/>
             </a:xfrm>
@@ -4862,7 +5345,7 @@
             </a:prstGeom>
           </p:spPr>
           <p:txBody>
-            <a:bodyPr lIns="0" tIns="0" rIns="0" bIns="0" rtlCol="0" anchor="t">
+            <a:bodyPr anchor="t" rtlCol="false" tIns="0" lIns="0" bIns="0" rIns="0">
               <a:spAutoFit/>
             </a:bodyPr>
             <a:lstStyle/>
@@ -4886,12 +5369,12 @@
         </p:sp>
         <p:sp>
           <p:nvSpPr>
-            <p:cNvPr id="15" name="TextBox 15"/>
-            <p:cNvSpPr txBox="1"/>
+            <p:cNvPr name="TextBox 15" id="15"/>
+            <p:cNvSpPr txBox="true"/>
             <p:nvPr/>
           </p:nvSpPr>
           <p:spPr>
-            <a:xfrm>
+            <a:xfrm rot="0">
               <a:off x="336573" y="2467150"/>
               <a:ext cx="785338" cy="525860"/>
             </a:xfrm>
@@ -4900,7 +5383,7 @@
             </a:prstGeom>
           </p:spPr>
           <p:txBody>
-            <a:bodyPr lIns="0" tIns="0" rIns="0" bIns="0" rtlCol="0" anchor="t">
+            <a:bodyPr anchor="t" rtlCol="false" tIns="0" lIns="0" bIns="0" rIns="0">
               <a:spAutoFit/>
             </a:bodyPr>
             <a:lstStyle/>
@@ -4924,12 +5407,12 @@
         </p:sp>
         <p:sp>
           <p:nvSpPr>
-            <p:cNvPr id="16" name="TextBox 16"/>
-            <p:cNvSpPr txBox="1"/>
+            <p:cNvPr name="TextBox 16" id="16"/>
+            <p:cNvSpPr txBox="true"/>
             <p:nvPr/>
           </p:nvSpPr>
           <p:spPr>
-            <a:xfrm>
+            <a:xfrm rot="0">
               <a:off x="336573" y="4991451"/>
               <a:ext cx="785338" cy="525860"/>
             </a:xfrm>
@@ -4938,7 +5421,7 @@
             </a:prstGeom>
           </p:spPr>
           <p:txBody>
-            <a:bodyPr lIns="0" tIns="0" rIns="0" bIns="0" rtlCol="0" anchor="t">
+            <a:bodyPr anchor="t" rtlCol="false" tIns="0" lIns="0" bIns="0" rIns="0">
               <a:spAutoFit/>
             </a:bodyPr>
             <a:lstStyle/>
@@ -4962,12 +5445,12 @@
         </p:sp>
         <p:sp>
           <p:nvSpPr>
-            <p:cNvPr id="17" name="TextBox 17"/>
-            <p:cNvSpPr txBox="1"/>
+            <p:cNvPr name="TextBox 17" id="17"/>
+            <p:cNvSpPr txBox="true"/>
             <p:nvPr/>
           </p:nvSpPr>
           <p:spPr>
-            <a:xfrm>
+            <a:xfrm rot="0">
               <a:off x="336573" y="7515751"/>
               <a:ext cx="785338" cy="525860"/>
             </a:xfrm>
@@ -4976,7 +5459,7 @@
             </a:prstGeom>
           </p:spPr>
           <p:txBody>
-            <a:bodyPr lIns="0" tIns="0" rIns="0" bIns="0" rtlCol="0" anchor="t">
+            <a:bodyPr anchor="t" rtlCol="false" tIns="0" lIns="0" bIns="0" rIns="0">
               <a:spAutoFit/>
             </a:bodyPr>
             <a:lstStyle/>
@@ -5000,12 +5483,12 @@
         </p:sp>
         <p:sp>
           <p:nvSpPr>
-            <p:cNvPr id="18" name="TextBox 18"/>
-            <p:cNvSpPr txBox="1"/>
+            <p:cNvPr name="TextBox 18" id="18"/>
+            <p:cNvSpPr txBox="true"/>
             <p:nvPr/>
           </p:nvSpPr>
           <p:spPr>
-            <a:xfrm>
+            <a:xfrm rot="0">
               <a:off x="785338" y="10040051"/>
               <a:ext cx="336573" cy="525860"/>
             </a:xfrm>
@@ -5014,7 +5497,7 @@
             </a:prstGeom>
           </p:spPr>
           <p:txBody>
-            <a:bodyPr lIns="0" tIns="0" rIns="0" bIns="0" rtlCol="0" anchor="t">
+            <a:bodyPr anchor="t" rtlCol="false" tIns="0" lIns="0" bIns="0" rIns="0">
               <a:spAutoFit/>
             </a:bodyPr>
             <a:lstStyle/>
@@ -5038,14 +5521,14 @@
         </p:sp>
         <p:grpSp>
           <p:nvGrpSpPr>
-            <p:cNvPr id="19" name="Group 19"/>
+            <p:cNvPr name="Group 19" id="19"/>
             <p:cNvGrpSpPr>
-              <a:grpSpLocks noChangeAspect="1"/>
+              <a:grpSpLocks noChangeAspect="true"/>
             </p:cNvGrpSpPr>
             <p:nvPr/>
           </p:nvGrpSpPr>
           <p:grpSpPr>
-            <a:xfrm>
+            <a:xfrm rot="0">
               <a:off x="1321362" y="234355"/>
               <a:ext cx="10097201" cy="10097201"/>
               <a:chOff x="0" y="0"/>
@@ -5054,7 +5537,7 @@
           </p:grpSpPr>
           <p:sp>
             <p:nvSpPr>
-              <p:cNvPr id="20" name="Freeform 20"/>
+              <p:cNvPr name="Freeform 20" id="20"/>
               <p:cNvSpPr/>
               <p:nvPr/>
             </p:nvSpPr>
@@ -5068,9 +5551,9 @@
                 <a:gdLst/>
                 <a:ahLst/>
                 <a:cxnLst/>
-                <a:rect l="l" t="t" r="r" b="b"/>
+                <a:rect r="r" b="b" t="t" l="l"/>
                 <a:pathLst>
-                  <a:path w="2148240" h="6881521">
+                  <a:path h="6881521" w="2148240">
                     <a:moveTo>
                       <a:pt x="127000" y="6818305"/>
                     </a:moveTo>
@@ -5118,7 +5601,7 @@
           </p:sp>
           <p:sp>
             <p:nvSpPr>
-              <p:cNvPr id="21" name="Freeform 21"/>
+              <p:cNvPr name="Freeform 21" id="21"/>
               <p:cNvSpPr/>
               <p:nvPr/>
             </p:nvSpPr>
@@ -5132,9 +5615,9 @@
                 <a:gdLst/>
                 <a:ahLst/>
                 <a:cxnLst/>
-                <a:rect l="l" t="t" r="r" b="b"/>
+                <a:rect r="r" b="b" t="t" l="l"/>
                 <a:pathLst>
-                  <a:path w="2147808" h="5864415">
+                  <a:path h="5864415" w="2147808">
                     <a:moveTo>
                       <a:pt x="127000" y="63217"/>
                     </a:moveTo>
@@ -5182,7 +5665,7 @@
           </p:sp>
           <p:sp>
             <p:nvSpPr>
-              <p:cNvPr id="22" name="Freeform 22"/>
+              <p:cNvPr name="Freeform 22" id="22"/>
               <p:cNvSpPr/>
               <p:nvPr/>
             </p:nvSpPr>
@@ -5196,9 +5679,9 @@
                 <a:gdLst/>
                 <a:ahLst/>
                 <a:cxnLst/>
-                <a:rect l="l" t="t" r="r" b="b"/>
+                <a:rect r="r" b="b" t="t" l="l"/>
                 <a:pathLst>
-                  <a:path w="2139951" h="1936174">
+                  <a:path h="1936174" w="2139951">
                     <a:moveTo>
                       <a:pt x="127000" y="63217"/>
                     </a:moveTo>
@@ -5246,7 +5729,7 @@
           </p:sp>
           <p:sp>
             <p:nvSpPr>
-              <p:cNvPr id="23" name="Freeform 23"/>
+              <p:cNvPr name="Freeform 23" id="23"/>
               <p:cNvSpPr/>
               <p:nvPr/>
             </p:nvSpPr>
@@ -5260,9 +5743,9 @@
                 <a:gdLst/>
                 <a:ahLst/>
                 <a:cxnLst/>
-                <a:rect l="l" t="t" r="r" b="b"/>
+                <a:rect r="r" b="b" t="t" l="l"/>
                 <a:pathLst>
-                  <a:path w="2184400" h="3212533">
+                  <a:path h="3212533" w="2184400">
                     <a:moveTo>
                       <a:pt x="127000" y="3149317"/>
                     </a:moveTo>
@@ -5334,7 +5817,7 @@
           </p:sp>
           <p:sp>
             <p:nvSpPr>
-              <p:cNvPr id="24" name="Freeform 24"/>
+              <p:cNvPr name="Freeform 24" id="24"/>
               <p:cNvSpPr/>
               <p:nvPr/>
             </p:nvSpPr>
@@ -5348,9 +5831,9 @@
                 <a:gdLst/>
                 <a:ahLst/>
                 <a:cxnLst/>
-                <a:rect l="l" t="t" r="r" b="b"/>
+                <a:rect r="r" b="b" t="t" l="l"/>
                 <a:pathLst>
-                  <a:path w="2133819" h="1137979">
+                  <a:path h="1137979" w="2133819">
                     <a:moveTo>
                       <a:pt x="127000" y="63217"/>
                     </a:moveTo>
@@ -5398,7 +5881,7 @@
           </p:sp>
           <p:sp>
             <p:nvSpPr>
-              <p:cNvPr id="25" name="Freeform 25"/>
+              <p:cNvPr name="Freeform 25" id="25"/>
               <p:cNvSpPr/>
               <p:nvPr/>
             </p:nvSpPr>
@@ -5412,9 +5895,9 @@
                 <a:gdLst/>
                 <a:ahLst/>
                 <a:cxnLst/>
-                <a:rect l="l" t="t" r="r" b="b"/>
+                <a:rect r="r" b="b" t="t" l="l"/>
                 <a:pathLst>
-                  <a:path w="2134701" h="1230095">
+                  <a:path h="1230095" w="2134701">
                     <a:moveTo>
                       <a:pt x="127000" y="1166878"/>
                     </a:moveTo>
@@ -5462,7 +5945,7 @@
           </p:sp>
           <p:sp>
             <p:nvSpPr>
-              <p:cNvPr id="26" name="Freeform 26"/>
+              <p:cNvPr name="Freeform 26" id="26"/>
               <p:cNvSpPr/>
               <p:nvPr/>
             </p:nvSpPr>
@@ -5476,9 +5959,9 @@
                 <a:gdLst/>
                 <a:ahLst/>
                 <a:cxnLst/>
-                <a:rect l="l" t="t" r="r" b="b"/>
+                <a:rect r="r" b="b" t="t" l="l"/>
                 <a:pathLst>
-                  <a:path w="2120900" h="126433">
+                  <a:path h="126433" w="2120900">
                     <a:moveTo>
                       <a:pt x="127000" y="63217"/>
                     </a:moveTo>
@@ -5526,7 +6009,7 @@
           </p:sp>
           <p:sp>
             <p:nvSpPr>
-              <p:cNvPr id="27" name="Freeform 27"/>
+              <p:cNvPr name="Freeform 27" id="27"/>
               <p:cNvSpPr/>
               <p:nvPr/>
             </p:nvSpPr>
@@ -5540,9 +6023,9 @@
                 <a:gdLst/>
                 <a:ahLst/>
                 <a:cxnLst/>
-                <a:rect l="l" t="t" r="r" b="b"/>
+                <a:rect r="r" b="b" t="t" l="l"/>
                 <a:pathLst>
-                  <a:path w="2184400" h="5197924">
+                  <a:path h="5197924" w="2184400">
                     <a:moveTo>
                       <a:pt x="127000" y="63217"/>
                     </a:moveTo>
@@ -5614,7 +6097,7 @@
           </p:sp>
           <p:sp>
             <p:nvSpPr>
-              <p:cNvPr id="28" name="Freeform 28"/>
+              <p:cNvPr name="Freeform 28" id="28"/>
               <p:cNvSpPr/>
               <p:nvPr/>
             </p:nvSpPr>
@@ -5628,9 +6111,9 @@
                 <a:gdLst/>
                 <a:ahLst/>
                 <a:cxnLst/>
-                <a:rect l="l" t="t" r="r" b="b"/>
+                <a:rect r="r" b="b" t="t" l="l"/>
                 <a:pathLst>
-                  <a:path w="2124005" h="317936">
+                  <a:path h="317936" w="2124005">
                     <a:moveTo>
                       <a:pt x="127000" y="63216"/>
                     </a:moveTo>
@@ -5678,7 +6161,7 @@
           </p:sp>
           <p:sp>
             <p:nvSpPr>
-              <p:cNvPr id="29" name="Freeform 29"/>
+              <p:cNvPr name="Freeform 29" id="29"/>
               <p:cNvSpPr/>
               <p:nvPr/>
             </p:nvSpPr>
@@ -5692,9 +6175,9 @@
                 <a:gdLst/>
                 <a:ahLst/>
                 <a:cxnLst/>
-                <a:rect l="l" t="t" r="r" b="b"/>
+                <a:rect r="r" b="b" t="t" l="l"/>
                 <a:pathLst>
-                  <a:path w="2120900" h="126433">
+                  <a:path h="126433" w="2120900">
                     <a:moveTo>
                       <a:pt x="127000" y="63216"/>
                     </a:moveTo>
@@ -5742,7 +6225,7 @@
           </p:sp>
           <p:sp>
             <p:nvSpPr>
-              <p:cNvPr id="30" name="Freeform 30"/>
+              <p:cNvPr name="Freeform 30" id="30"/>
               <p:cNvSpPr/>
               <p:nvPr/>
             </p:nvSpPr>
@@ -5756,9 +6239,9 @@
                 <a:gdLst/>
                 <a:ahLst/>
                 <a:cxnLst/>
-                <a:rect l="l" t="t" r="r" b="b"/>
+                <a:rect r="r" b="b" t="t" l="l"/>
                 <a:pathLst>
-                  <a:path w="2148050" h="6378060">
+                  <a:path h="6378060" w="2148050">
                     <a:moveTo>
                       <a:pt x="127000" y="6314843"/>
                     </a:moveTo>
@@ -5806,7 +6289,7 @@
           </p:sp>
           <p:sp>
             <p:nvSpPr>
-              <p:cNvPr id="31" name="Freeform 31"/>
+              <p:cNvPr name="Freeform 31" id="31"/>
               <p:cNvSpPr/>
               <p:nvPr/>
             </p:nvSpPr>
@@ -5820,9 +6303,9 @@
                 <a:gdLst/>
                 <a:ahLst/>
                 <a:cxnLst/>
-                <a:rect l="l" t="t" r="r" b="b"/>
+                <a:rect r="r" b="b" t="t" l="l"/>
                 <a:pathLst>
-                  <a:path w="2184400" h="6638105">
+                  <a:path h="6638105" w="2184400">
                     <a:moveTo>
                       <a:pt x="127000" y="63217"/>
                     </a:moveTo>
@@ -5894,23 +6377,48 @@
           </p:sp>
         </p:grpSp>
       </p:grpSp>
-      <p:sp>
-        <p:nvSpPr>
-          <p:cNvPr id="33" name="TextBox 33"/>
-          <p:cNvSpPr txBox="1"/>
+      <p:pic>
+        <p:nvPicPr>
+          <p:cNvPr name="Picture 32" id="32"/>
+          <p:cNvPicPr>
+            <a:picLocks noChangeAspect="true"/>
+          </p:cNvPicPr>
           <p:nvPr/>
-        </p:nvSpPr>
+        </p:nvPicPr>
+        <p:blipFill>
+          <a:blip r:embed="rId2"/>
+          <a:srcRect l="0" t="0" r="0" b="0"/>
+          <a:stretch>
+            <a:fillRect/>
+          </a:stretch>
+        </p:blipFill>
         <p:spPr>
-          <a:xfrm>
-            <a:off x="1028700" y="438150"/>
-            <a:ext cx="7237185" cy="1162050"/>
+          <a:xfrm flipH="false" flipV="false" rot="0">
+            <a:off x="4281961" y="2826742"/>
+            <a:ext cx="11301259" cy="4633516"/>
           </a:xfrm>
           <a:prstGeom prst="rect">
             <a:avLst/>
           </a:prstGeom>
         </p:spPr>
-        <p:txBody>
-          <a:bodyPr lIns="0" tIns="0" rIns="0" bIns="0" rtlCol="0" anchor="t">
+      </p:pic>
+      <p:sp>
+        <p:nvSpPr>
+          <p:cNvPr name="TextBox 33" id="33"/>
+          <p:cNvSpPr txBox="true"/>
+          <p:nvPr/>
+        </p:nvSpPr>
+        <p:spPr>
+          <a:xfrm rot="0">
+            <a:off x="1028700" y="438150"/>
+            <a:ext cx="7237185" cy="1162050"/>
+          </a:xfrm>
+          <a:prstGeom prst="rect">
+            <a:avLst/>
+          </a:prstGeom>
+        </p:spPr>
+        <p:txBody>
+          <a:bodyPr anchor="t" rtlCol="false" tIns="0" lIns="0" bIns="0" rIns="0">
             <a:spAutoFit/>
           </a:bodyPr>
           <a:lstStyle/>
@@ -5932,42 +6440,6 @@
           </a:p>
         </p:txBody>
       </p:sp>
-      <p:pic>
-        <p:nvPicPr>
-          <p:cNvPr id="35" name="Imagem 34" descr="Tela de celular com texto preto sobre fundo branco&#10;&#10;Descrição gerada automaticamente">
-            <a:extLst>
-              <a:ext uri="{FF2B5EF4-FFF2-40B4-BE49-F238E27FC236}">
-                <a16:creationId xmlns:a16="http://schemas.microsoft.com/office/drawing/2014/main" id="{891EF4A4-A461-46DF-980B-20FBF3DCAC7C}"/>
-              </a:ext>
-            </a:extLst>
-          </p:cNvPr>
-          <p:cNvPicPr>
-            <a:picLocks noChangeAspect="1"/>
-          </p:cNvPicPr>
-          <p:nvPr/>
-        </p:nvPicPr>
-        <p:blipFill>
-          <a:blip r:embed="rId2">
-            <a:extLst>
-              <a:ext uri="{28A0092B-C50C-407E-A947-70E740481C1C}">
-                <a14:useLocalDpi xmlns:a14="http://schemas.microsoft.com/office/drawing/2010/main" val="0"/>
-              </a:ext>
-            </a:extLst>
-          </a:blip>
-          <a:stretch>
-            <a:fillRect/>
-          </a:stretch>
-        </p:blipFill>
-        <p:spPr>
-          <a:xfrm>
-            <a:off x="3209219" y="2524125"/>
-            <a:ext cx="12954000" cy="5238750"/>
-          </a:xfrm>
-          <a:prstGeom prst="rect">
-            <a:avLst/>
-          </a:prstGeom>
-        </p:spPr>
-      </p:pic>
     </p:spTree>
   </p:cSld>
   <p:clrMapOvr>
@@ -5977,14 +6449,13 @@
 </file>
 
 <file path=ppt/slides/slide9.xml><?xml version="1.0" encoding="utf-8"?>
-<p:sld xmlns:a="http://schemas.openxmlformats.org/drawingml/2006/main" xmlns:r="http://schemas.openxmlformats.org/officeDocument/2006/relationships" xmlns:p="http://schemas.openxmlformats.org/presentationml/2006/main">
+<p:sld xmlns:p="http://schemas.openxmlformats.org/presentationml/2006/main" xmlns:a="http://schemas.openxmlformats.org/drawingml/2006/main" xmlns:r="http://schemas.openxmlformats.org/officeDocument/2006/relationships">
   <p:cSld>
     <p:bg>
       <p:bgPr>
         <a:solidFill>
           <a:srgbClr val="113C61"/>
         </a:solidFill>
-        <a:effectLst/>
       </p:bgPr>
     </p:bg>
     <p:spTree>
@@ -6003,14 +6474,14 @@
       </p:grpSpPr>
       <p:sp>
         <p:nvSpPr>
-          <p:cNvPr id="2" name="AutoShape 2"/>
+          <p:cNvPr name="AutoShape 2" id="2"/>
           <p:cNvSpPr/>
           <p:nvPr/>
         </p:nvSpPr>
         <p:spPr>
-          <a:xfrm>
-            <a:off x="10757811" y="-270930"/>
-            <a:ext cx="7793062" cy="10828860"/>
+          <a:xfrm rot="0">
+            <a:off x="8887570" y="-270930"/>
+            <a:ext cx="9400430" cy="10828860"/>
           </a:xfrm>
           <a:prstGeom prst="rect">
             <a:avLst/>
@@ -6020,23 +6491,48 @@
           </a:solidFill>
         </p:spPr>
       </p:sp>
-      <p:sp>
-        <p:nvSpPr>
-          <p:cNvPr id="4" name="TextBox 4"/>
-          <p:cNvSpPr txBox="1"/>
+      <p:pic>
+        <p:nvPicPr>
+          <p:cNvPr name="Picture 3" id="3"/>
+          <p:cNvPicPr>
+            <a:picLocks noChangeAspect="true"/>
+          </p:cNvPicPr>
           <p:nvPr/>
-        </p:nvSpPr>
+        </p:nvPicPr>
+        <p:blipFill>
+          <a:blip r:embed="rId2"/>
+          <a:srcRect l="0" t="0" r="0" b="0"/>
+          <a:stretch>
+            <a:fillRect/>
+          </a:stretch>
+        </p:blipFill>
         <p:spPr>
-          <a:xfrm>
-            <a:off x="817748" y="205083"/>
-            <a:ext cx="9804231" cy="1162050"/>
+          <a:xfrm flipH="false" flipV="false" rot="0">
+            <a:off x="3989979" y="2890608"/>
+            <a:ext cx="9795183" cy="4505784"/>
           </a:xfrm>
           <a:prstGeom prst="rect">
             <a:avLst/>
           </a:prstGeom>
         </p:spPr>
-        <p:txBody>
-          <a:bodyPr lIns="0" tIns="0" rIns="0" bIns="0" rtlCol="0" anchor="t">
+      </p:pic>
+      <p:sp>
+        <p:nvSpPr>
+          <p:cNvPr name="TextBox 4" id="4"/>
+          <p:cNvSpPr txBox="true"/>
+          <p:nvPr/>
+        </p:nvSpPr>
+        <p:spPr>
+          <a:xfrm rot="0">
+            <a:off x="3167396" y="438150"/>
+            <a:ext cx="10420389" cy="1162050"/>
+          </a:xfrm>
+          <a:prstGeom prst="rect">
+            <a:avLst/>
+          </a:prstGeom>
+        </p:spPr>
+        <p:txBody>
+          <a:bodyPr anchor="t" rtlCol="false" tIns="0" lIns="0" bIns="0" rIns="0">
             <a:spAutoFit/>
           </a:bodyPr>
           <a:lstStyle/>
@@ -6053,47 +6549,20 @@
                 </a:solidFill>
                 <a:latin typeface="Josefin Slab"/>
               </a:rPr>
-              <a:t>Simulado de orçamento</a:t>
-            </a:r>
-          </a:p>
-        </p:txBody>
-      </p:sp>
-      <p:pic>
-        <p:nvPicPr>
-          <p:cNvPr id="6" name="Imagem 5" descr="Tela de celular com texto preto sobre fundo branco&#10;&#10;Descrição gerada automaticamente">
-            <a:extLst>
-              <a:ext uri="{FF2B5EF4-FFF2-40B4-BE49-F238E27FC236}">
-                <a16:creationId xmlns:a16="http://schemas.microsoft.com/office/drawing/2014/main" id="{076AED17-A920-493B-9F14-B4435E0B27F2}"/>
-              </a:ext>
-            </a:extLst>
-          </p:cNvPr>
-          <p:cNvPicPr>
-            <a:picLocks noChangeAspect="1"/>
-          </p:cNvPicPr>
-          <p:nvPr/>
-        </p:nvPicPr>
-        <p:blipFill>
-          <a:blip r:embed="rId2">
-            <a:extLst>
-              <a:ext uri="{28A0092B-C50C-407E-A947-70E740481C1C}">
-                <a14:useLocalDpi xmlns:a14="http://schemas.microsoft.com/office/drawing/2010/main" val="0"/>
-              </a:ext>
-            </a:extLst>
-          </a:blip>
-          <a:stretch>
-            <a:fillRect/>
-          </a:stretch>
-        </p:blipFill>
-        <p:spPr>
-          <a:xfrm>
-            <a:off x="5354654" y="2628900"/>
-            <a:ext cx="10534650" cy="5924550"/>
-          </a:xfrm>
-          <a:prstGeom prst="rect">
-            <a:avLst/>
-          </a:prstGeom>
-        </p:spPr>
-      </p:pic>
+              <a:t>Simulador de</a:t>
+            </a:r>
+            <a:r>
+              <a:rPr lang="en-US" sz="7500" spc="150">
+                <a:solidFill>
+                  <a:srgbClr val="000000"/>
+                </a:solidFill>
+                <a:latin typeface="Josefin Slab"/>
+              </a:rPr>
+              <a:t> orçamento</a:t>
+            </a:r>
+          </a:p>
+        </p:txBody>
+      </p:sp>
     </p:spTree>
   </p:cSld>
   <p:clrMapOvr>

</xml_diff>